<commit_message>
Add algorithm to PPT
</commit_message>
<xml_diff>
--- a/presentations/Review 2 - Project Progress Presentation 2020.pptx
+++ b/presentations/Review 2 - Project Progress Presentation 2020.pptx
@@ -25,6 +25,8 @@
     <p:sldId id="270" r:id="rId18"/>
     <p:sldId id="271" r:id="rId19"/>
     <p:sldId id="272" r:id="rId20"/>
+    <p:sldId id="273" r:id="rId21"/>
+    <p:sldId id="274" r:id="rId22"/>
   </p:sldIdLst>
   <p:sldSz cx="9144000" cy="6858000"/>
   <p:notesSz cx="6797675" cy="9874250"/>
@@ -255,7 +257,7 @@
           </a:bodyPr>
           <a:p>
             <a:pPr algn="r"/>
-            <a:fld id="{25E1DB71-29A5-43EE-B931-CD53E6B89C7E}" type="slidenum">
+            <a:fld id="{B1113202-9E66-4603-8CFD-951FE3D79942}" type="slidenum">
               <a:rPr b="0" lang="en-IN" sz="1400" spc="-1" strike="noStrike">
                 <a:latin typeface="Times New Roman"/>
               </a:rPr>
@@ -292,7 +294,7 @@
       </p:grpSpPr>
       <p:sp>
         <p:nvSpPr>
-          <p:cNvPr id="106" name="PlaceHolder 1"/>
+          <p:cNvPr id="112" name="PlaceHolder 1"/>
           <p:cNvSpPr>
             <a:spLocks noGrp="1"/>
           </p:cNvSpPr>
@@ -303,7 +305,7 @@
         <p:spPr>
           <a:xfrm>
             <a:off x="680400" y="4690800"/>
-            <a:ext cx="5436000" cy="4440960"/>
+            <a:ext cx="5435640" cy="4440600"/>
           </a:xfrm>
           <a:prstGeom prst="rect">
             <a:avLst/>
@@ -322,14 +324,14 @@
       </p:sp>
       <p:sp>
         <p:nvSpPr>
-          <p:cNvPr id="107" name="CustomShape 2"/>
+          <p:cNvPr id="113" name="CustomShape 2"/>
           <p:cNvSpPr/>
           <p:nvPr/>
         </p:nvSpPr>
         <p:spPr>
           <a:xfrm>
             <a:off x="3849840" y="9378360"/>
-            <a:ext cx="2944440" cy="491760"/>
+            <a:ext cx="2944080" cy="491400"/>
           </a:xfrm>
           <a:prstGeom prst="rect">
             <a:avLst/>
@@ -355,7 +357,7 @@
                 <a:spcPct val="100000"/>
               </a:lnSpc>
             </a:pPr>
-            <a:fld id="{D5CEC7BD-608A-42BE-A5DB-1B056894C54D}" type="slidenum">
+            <a:fld id="{2E77DE51-1A9F-4FC8-A22C-EBF1322E77B4}" type="slidenum">
               <a:rPr b="0" lang="en-IN" sz="1400" spc="-1" strike="noStrike">
                 <a:solidFill>
                   <a:srgbClr val="000000"/>
@@ -395,7 +397,7 @@
       </p:grpSpPr>
       <p:sp>
         <p:nvSpPr>
-          <p:cNvPr id="108" name="PlaceHolder 1"/>
+          <p:cNvPr id="114" name="PlaceHolder 1"/>
           <p:cNvSpPr>
             <a:spLocks noGrp="1"/>
           </p:cNvSpPr>
@@ -406,7 +408,7 @@
         <p:spPr>
           <a:xfrm>
             <a:off x="680400" y="4690800"/>
-            <a:ext cx="5436000" cy="4440960"/>
+            <a:ext cx="5435640" cy="4440600"/>
           </a:xfrm>
           <a:prstGeom prst="rect">
             <a:avLst/>
@@ -425,14 +427,14 @@
       </p:sp>
       <p:sp>
         <p:nvSpPr>
-          <p:cNvPr id="109" name="CustomShape 2"/>
+          <p:cNvPr id="115" name="CustomShape 2"/>
           <p:cNvSpPr/>
           <p:nvPr/>
         </p:nvSpPr>
         <p:spPr>
           <a:xfrm>
             <a:off x="3849840" y="9378360"/>
-            <a:ext cx="2944440" cy="491760"/>
+            <a:ext cx="2944080" cy="491400"/>
           </a:xfrm>
           <a:prstGeom prst="rect">
             <a:avLst/>
@@ -458,7 +460,7 @@
                 <a:spcPct val="100000"/>
               </a:lnSpc>
             </a:pPr>
-            <a:fld id="{67A64534-F013-4523-BA56-052686720EAF}" type="slidenum">
+            <a:fld id="{039FCFCE-56E7-48E9-987E-53475BCBD117}" type="slidenum">
               <a:rPr b="0" lang="en-IN" sz="1400" spc="-1" strike="noStrike">
                 <a:solidFill>
                   <a:srgbClr val="000000"/>
@@ -498,7 +500,7 @@
       </p:grpSpPr>
       <p:sp>
         <p:nvSpPr>
-          <p:cNvPr id="110" name="PlaceHolder 1"/>
+          <p:cNvPr id="116" name="PlaceHolder 1"/>
           <p:cNvSpPr>
             <a:spLocks noGrp="1"/>
           </p:cNvSpPr>
@@ -509,7 +511,7 @@
         <p:spPr>
           <a:xfrm>
             <a:off x="680400" y="4690800"/>
-            <a:ext cx="5436000" cy="4440960"/>
+            <a:ext cx="5435640" cy="4440600"/>
           </a:xfrm>
           <a:prstGeom prst="rect">
             <a:avLst/>
@@ -528,14 +530,14 @@
       </p:sp>
       <p:sp>
         <p:nvSpPr>
-          <p:cNvPr id="111" name="CustomShape 2"/>
+          <p:cNvPr id="117" name="CustomShape 2"/>
           <p:cNvSpPr/>
           <p:nvPr/>
         </p:nvSpPr>
         <p:spPr>
           <a:xfrm>
             <a:off x="3849840" y="9378360"/>
-            <a:ext cx="2944080" cy="492120"/>
+            <a:ext cx="2943720" cy="491760"/>
           </a:xfrm>
           <a:prstGeom prst="rect">
             <a:avLst/>
@@ -561,7 +563,7 @@
                 <a:spcPct val="100000"/>
               </a:lnSpc>
             </a:pPr>
-            <a:fld id="{7066F66F-05BA-42F7-9A7A-8E56671466C9}" type="slidenum">
+            <a:fld id="{DC478665-0E89-4663-B971-CAC24C7B879F}" type="slidenum">
               <a:rPr b="0" lang="en-IN" sz="1400" spc="-1" strike="noStrike">
                 <a:solidFill>
                   <a:srgbClr val="000000"/>
@@ -601,7 +603,7 @@
       </p:grpSpPr>
       <p:sp>
         <p:nvSpPr>
-          <p:cNvPr id="112" name="PlaceHolder 1"/>
+          <p:cNvPr id="118" name="PlaceHolder 1"/>
           <p:cNvSpPr>
             <a:spLocks noGrp="1"/>
           </p:cNvSpPr>
@@ -612,7 +614,7 @@
         <p:spPr>
           <a:xfrm>
             <a:off x="680400" y="4690800"/>
-            <a:ext cx="5436000" cy="4440960"/>
+            <a:ext cx="5435640" cy="4440600"/>
           </a:xfrm>
           <a:prstGeom prst="rect">
             <a:avLst/>
@@ -631,14 +633,14 @@
       </p:sp>
       <p:sp>
         <p:nvSpPr>
-          <p:cNvPr id="113" name="CustomShape 2"/>
+          <p:cNvPr id="119" name="CustomShape 2"/>
           <p:cNvSpPr/>
           <p:nvPr/>
         </p:nvSpPr>
         <p:spPr>
           <a:xfrm>
             <a:off x="3849840" y="9378360"/>
-            <a:ext cx="2944080" cy="492120"/>
+            <a:ext cx="2943720" cy="491760"/>
           </a:xfrm>
           <a:prstGeom prst="rect">
             <a:avLst/>
@@ -664,7 +666,7 @@
                 <a:spcPct val="100000"/>
               </a:lnSpc>
             </a:pPr>
-            <a:fld id="{9162FD67-D1EF-4F86-B92C-69F2060EF2C1}" type="slidenum">
+            <a:fld id="{38EC0C9B-65BF-4A85-88BD-257EE13022F0}" type="slidenum">
               <a:rPr b="0" lang="en-IN" sz="1400" spc="-1" strike="noStrike">
                 <a:solidFill>
                   <a:srgbClr val="000000"/>
@@ -704,7 +706,7 @@
       </p:grpSpPr>
       <p:sp>
         <p:nvSpPr>
-          <p:cNvPr id="114" name="PlaceHolder 1"/>
+          <p:cNvPr id="120" name="PlaceHolder 1"/>
           <p:cNvSpPr>
             <a:spLocks noGrp="1"/>
           </p:cNvSpPr>
@@ -715,7 +717,7 @@
         <p:spPr>
           <a:xfrm>
             <a:off x="680400" y="4690800"/>
-            <a:ext cx="5436000" cy="4440960"/>
+            <a:ext cx="5435640" cy="4440600"/>
           </a:xfrm>
           <a:prstGeom prst="rect">
             <a:avLst/>
@@ -734,14 +736,14 @@
       </p:sp>
       <p:sp>
         <p:nvSpPr>
-          <p:cNvPr id="115" name="CustomShape 2"/>
+          <p:cNvPr id="121" name="CustomShape 2"/>
           <p:cNvSpPr/>
           <p:nvPr/>
         </p:nvSpPr>
         <p:spPr>
           <a:xfrm>
             <a:off x="3849840" y="9378360"/>
-            <a:ext cx="2944080" cy="492120"/>
+            <a:ext cx="2943720" cy="491760"/>
           </a:xfrm>
           <a:prstGeom prst="rect">
             <a:avLst/>
@@ -767,7 +769,7 @@
                 <a:spcPct val="100000"/>
               </a:lnSpc>
             </a:pPr>
-            <a:fld id="{D5F2346F-6B8A-47FF-BD14-CD78AB8ED370}" type="slidenum">
+            <a:fld id="{491E0487-D1BF-4855-BD0B-602E7578140C}" type="slidenum">
               <a:rPr b="0" lang="en-IN" sz="1400" spc="-1" strike="noStrike">
                 <a:solidFill>
                   <a:srgbClr val="000000"/>
@@ -807,7 +809,7 @@
       </p:grpSpPr>
       <p:sp>
         <p:nvSpPr>
-          <p:cNvPr id="116" name="PlaceHolder 1"/>
+          <p:cNvPr id="122" name="PlaceHolder 1"/>
           <p:cNvSpPr>
             <a:spLocks noGrp="1"/>
           </p:cNvSpPr>
@@ -818,7 +820,7 @@
         <p:spPr>
           <a:xfrm>
             <a:off x="680400" y="4690800"/>
-            <a:ext cx="5436000" cy="4440960"/>
+            <a:ext cx="5435640" cy="4440600"/>
           </a:xfrm>
           <a:prstGeom prst="rect">
             <a:avLst/>
@@ -837,14 +839,14 @@
       </p:sp>
       <p:sp>
         <p:nvSpPr>
-          <p:cNvPr id="117" name="CustomShape 2"/>
+          <p:cNvPr id="123" name="CustomShape 2"/>
           <p:cNvSpPr/>
           <p:nvPr/>
         </p:nvSpPr>
         <p:spPr>
           <a:xfrm>
             <a:off x="3849840" y="9378360"/>
-            <a:ext cx="2944080" cy="492120"/>
+            <a:ext cx="2943720" cy="491760"/>
           </a:xfrm>
           <a:prstGeom prst="rect">
             <a:avLst/>
@@ -870,7 +872,7 @@
                 <a:spcPct val="100000"/>
               </a:lnSpc>
             </a:pPr>
-            <a:fld id="{D339A5F6-2DCC-4054-A05F-D5BBF56D2CF0}" type="slidenum">
+            <a:fld id="{5ED10752-F8D7-4569-84F8-9D2EB78081D9}" type="slidenum">
               <a:rPr b="0" lang="en-IN" sz="1400" spc="-1" strike="noStrike">
                 <a:solidFill>
                   <a:srgbClr val="000000"/>
@@ -910,7 +912,7 @@
       </p:grpSpPr>
       <p:sp>
         <p:nvSpPr>
-          <p:cNvPr id="118" name="PlaceHolder 1"/>
+          <p:cNvPr id="124" name="PlaceHolder 1"/>
           <p:cNvSpPr>
             <a:spLocks noGrp="1"/>
           </p:cNvSpPr>
@@ -921,7 +923,7 @@
         <p:spPr>
           <a:xfrm>
             <a:off x="680400" y="4690800"/>
-            <a:ext cx="5436000" cy="4440960"/>
+            <a:ext cx="5435640" cy="4440600"/>
           </a:xfrm>
           <a:prstGeom prst="rect">
             <a:avLst/>
@@ -940,14 +942,14 @@
       </p:sp>
       <p:sp>
         <p:nvSpPr>
-          <p:cNvPr id="119" name="CustomShape 2"/>
+          <p:cNvPr id="125" name="CustomShape 2"/>
           <p:cNvSpPr/>
           <p:nvPr/>
         </p:nvSpPr>
         <p:spPr>
           <a:xfrm>
             <a:off x="3849840" y="9378360"/>
-            <a:ext cx="2944080" cy="492120"/>
+            <a:ext cx="2943720" cy="491760"/>
           </a:xfrm>
           <a:prstGeom prst="rect">
             <a:avLst/>
@@ -973,7 +975,213 @@
                 <a:spcPct val="100000"/>
               </a:lnSpc>
             </a:pPr>
-            <a:fld id="{A87899E8-BEB7-4701-BB6D-1CCE46D2A804}" type="slidenum">
+            <a:fld id="{7889656C-33E4-4314-B278-72632628BCFC}" type="slidenum">
+              <a:rPr b="0" lang="en-IN" sz="1400" spc="-1" strike="noStrike">
+                <a:solidFill>
+                  <a:srgbClr val="000000"/>
+                </a:solidFill>
+                <a:latin typeface="Times New Roman"/>
+                <a:ea typeface="+mn-ea"/>
+              </a:rPr>
+              <a:t>&lt;number&gt;</a:t>
+            </a:fld>
+            <a:endParaRPr b="0" lang="en-IN" sz="1400" spc="-1" strike="noStrike">
+              <a:latin typeface="Arial"/>
+            </a:endParaRPr>
+          </a:p>
+        </p:txBody>
+      </p:sp>
+    </p:spTree>
+  </p:cSld>
+</p:notes>
+</file>
+
+<file path=ppt/notesSlides/notesSlide17.xml><?xml version="1.0" encoding="utf-8"?>
+<p:notes xmlns:a="http://schemas.openxmlformats.org/drawingml/2006/main" xmlns:p="http://schemas.openxmlformats.org/presentationml/2006/main" xmlns:r="http://schemas.openxmlformats.org/officeDocument/2006/relationships" xmlns:p14="http://schemas.microsoft.com/office/powerpoint/2010/main" xmlns:p15="http://schemas.microsoft.com/office/powerpoint/2012/main" xmlns:mc="http://schemas.openxmlformats.org/markup-compatibility/2006">
+  <p:cSld>
+    <p:spTree>
+      <p:nvGrpSpPr>
+        <p:cNvPr id="1" name=""/>
+        <p:cNvGrpSpPr/>
+        <p:nvPr/>
+      </p:nvGrpSpPr>
+      <p:grpSpPr>
+        <a:xfrm>
+          <a:off x="0" y="0"/>
+          <a:ext cx="0" cy="0"/>
+          <a:chOff x="0" y="0"/>
+          <a:chExt cx="0" cy="0"/>
+        </a:xfrm>
+      </p:grpSpPr>
+      <p:sp>
+        <p:nvSpPr>
+          <p:cNvPr id="126" name="PlaceHolder 1"/>
+          <p:cNvSpPr>
+            <a:spLocks noGrp="1"/>
+          </p:cNvSpPr>
+          <p:nvPr>
+            <p:ph type="body"/>
+          </p:nvPr>
+        </p:nvSpPr>
+        <p:spPr>
+          <a:xfrm>
+            <a:off x="680400" y="4690800"/>
+            <a:ext cx="5435640" cy="4440600"/>
+          </a:xfrm>
+          <a:prstGeom prst="rect">
+            <a:avLst/>
+          </a:prstGeom>
+        </p:spPr>
+        <p:txBody>
+          <a:bodyPr lIns="0" rIns="0" tIns="0" bIns="0">
+            <a:noAutofit/>
+          </a:bodyPr>
+          <a:p>
+            <a:endParaRPr b="0" lang="en-IN" sz="2000" spc="-1" strike="noStrike">
+              <a:latin typeface="Arial"/>
+            </a:endParaRPr>
+          </a:p>
+        </p:txBody>
+      </p:sp>
+      <p:sp>
+        <p:nvSpPr>
+          <p:cNvPr id="127" name="CustomShape 2"/>
+          <p:cNvSpPr/>
+          <p:nvPr/>
+        </p:nvSpPr>
+        <p:spPr>
+          <a:xfrm>
+            <a:off x="3849840" y="9378360"/>
+            <a:ext cx="2943720" cy="491760"/>
+          </a:xfrm>
+          <a:prstGeom prst="rect">
+            <a:avLst/>
+          </a:prstGeom>
+          <a:noFill/>
+          <a:ln>
+            <a:noFill/>
+          </a:ln>
+        </p:spPr>
+        <p:style>
+          <a:lnRef idx="0"/>
+          <a:fillRef idx="0"/>
+          <a:effectRef idx="0"/>
+          <a:fontRef idx="minor"/>
+        </p:style>
+        <p:txBody>
+          <a:bodyPr lIns="90000" rIns="90000" tIns="45000" bIns="45000" anchor="b">
+            <a:noAutofit/>
+          </a:bodyPr>
+          <a:p>
+            <a:pPr algn="r">
+              <a:lnSpc>
+                <a:spcPct val="100000"/>
+              </a:lnSpc>
+            </a:pPr>
+            <a:fld id="{0D7C6A21-1A33-4A4F-80F6-749AF31F8FAF}" type="slidenum">
+              <a:rPr b="0" lang="en-IN" sz="1400" spc="-1" strike="noStrike">
+                <a:solidFill>
+                  <a:srgbClr val="000000"/>
+                </a:solidFill>
+                <a:latin typeface="Times New Roman"/>
+                <a:ea typeface="+mn-ea"/>
+              </a:rPr>
+              <a:t>&lt;number&gt;</a:t>
+            </a:fld>
+            <a:endParaRPr b="0" lang="en-IN" sz="1400" spc="-1" strike="noStrike">
+              <a:latin typeface="Arial"/>
+            </a:endParaRPr>
+          </a:p>
+        </p:txBody>
+      </p:sp>
+    </p:spTree>
+  </p:cSld>
+</p:notes>
+</file>
+
+<file path=ppt/notesSlides/notesSlide18.xml><?xml version="1.0" encoding="utf-8"?>
+<p:notes xmlns:a="http://schemas.openxmlformats.org/drawingml/2006/main" xmlns:p="http://schemas.openxmlformats.org/presentationml/2006/main" xmlns:r="http://schemas.openxmlformats.org/officeDocument/2006/relationships" xmlns:p14="http://schemas.microsoft.com/office/powerpoint/2010/main" xmlns:p15="http://schemas.microsoft.com/office/powerpoint/2012/main" xmlns:mc="http://schemas.openxmlformats.org/markup-compatibility/2006">
+  <p:cSld>
+    <p:spTree>
+      <p:nvGrpSpPr>
+        <p:cNvPr id="1" name=""/>
+        <p:cNvGrpSpPr/>
+        <p:nvPr/>
+      </p:nvGrpSpPr>
+      <p:grpSpPr>
+        <a:xfrm>
+          <a:off x="0" y="0"/>
+          <a:ext cx="0" cy="0"/>
+          <a:chOff x="0" y="0"/>
+          <a:chExt cx="0" cy="0"/>
+        </a:xfrm>
+      </p:grpSpPr>
+      <p:sp>
+        <p:nvSpPr>
+          <p:cNvPr id="128" name="PlaceHolder 1"/>
+          <p:cNvSpPr>
+            <a:spLocks noGrp="1"/>
+          </p:cNvSpPr>
+          <p:nvPr>
+            <p:ph type="body"/>
+          </p:nvPr>
+        </p:nvSpPr>
+        <p:spPr>
+          <a:xfrm>
+            <a:off x="680400" y="4690800"/>
+            <a:ext cx="5435640" cy="4440600"/>
+          </a:xfrm>
+          <a:prstGeom prst="rect">
+            <a:avLst/>
+          </a:prstGeom>
+        </p:spPr>
+        <p:txBody>
+          <a:bodyPr lIns="0" rIns="0" tIns="0" bIns="0">
+            <a:noAutofit/>
+          </a:bodyPr>
+          <a:p>
+            <a:endParaRPr b="0" lang="en-IN" sz="2000" spc="-1" strike="noStrike">
+              <a:latin typeface="Arial"/>
+            </a:endParaRPr>
+          </a:p>
+        </p:txBody>
+      </p:sp>
+      <p:sp>
+        <p:nvSpPr>
+          <p:cNvPr id="129" name="CustomShape 2"/>
+          <p:cNvSpPr/>
+          <p:nvPr/>
+        </p:nvSpPr>
+        <p:spPr>
+          <a:xfrm>
+            <a:off x="3849840" y="9378360"/>
+            <a:ext cx="2943720" cy="491760"/>
+          </a:xfrm>
+          <a:prstGeom prst="rect">
+            <a:avLst/>
+          </a:prstGeom>
+          <a:noFill/>
+          <a:ln>
+            <a:noFill/>
+          </a:ln>
+        </p:spPr>
+        <p:style>
+          <a:lnRef idx="0"/>
+          <a:fillRef idx="0"/>
+          <a:effectRef idx="0"/>
+          <a:fontRef idx="minor"/>
+        </p:style>
+        <p:txBody>
+          <a:bodyPr lIns="90000" rIns="90000" tIns="45000" bIns="45000" anchor="b">
+            <a:noAutofit/>
+          </a:bodyPr>
+          <a:p>
+            <a:pPr algn="r">
+              <a:lnSpc>
+                <a:spcPct val="100000"/>
+              </a:lnSpc>
+            </a:pPr>
+            <a:fld id="{DA3E7F20-717E-4602-8417-4A327972A24D}" type="slidenum">
               <a:rPr b="0" lang="en-IN" sz="1400" spc="-1" strike="noStrike">
                 <a:solidFill>
                   <a:srgbClr val="000000"/>
@@ -1013,7 +1221,7 @@
       </p:grpSpPr>
       <p:sp>
         <p:nvSpPr>
-          <p:cNvPr id="104" name="PlaceHolder 1"/>
+          <p:cNvPr id="110" name="PlaceHolder 1"/>
           <p:cNvSpPr>
             <a:spLocks noGrp="1"/>
           </p:cNvSpPr>
@@ -1024,7 +1232,7 @@
         <p:spPr>
           <a:xfrm>
             <a:off x="680400" y="4690800"/>
-            <a:ext cx="5436000" cy="4440960"/>
+            <a:ext cx="5435640" cy="4440600"/>
           </a:xfrm>
           <a:prstGeom prst="rect">
             <a:avLst/>
@@ -1043,14 +1251,14 @@
       </p:sp>
       <p:sp>
         <p:nvSpPr>
-          <p:cNvPr id="105" name="CustomShape 2"/>
+          <p:cNvPr id="111" name="CustomShape 2"/>
           <p:cNvSpPr/>
           <p:nvPr/>
         </p:nvSpPr>
         <p:spPr>
           <a:xfrm>
             <a:off x="3849840" y="9378360"/>
-            <a:ext cx="2944440" cy="491760"/>
+            <a:ext cx="2944080" cy="491400"/>
           </a:xfrm>
           <a:prstGeom prst="rect">
             <a:avLst/>
@@ -1076,7 +1284,7 @@
                 <a:spcPct val="100000"/>
               </a:lnSpc>
             </a:pPr>
-            <a:fld id="{F7E11511-1042-424C-BE14-5FC96585AE6C}" type="slidenum">
+            <a:fld id="{B998AE1C-26A5-4A09-B666-3FE8F4354379}" type="slidenum">
               <a:rPr b="0" lang="en-IN" sz="1400" spc="-1" strike="noStrike">
                 <a:solidFill>
                   <a:srgbClr val="000000"/>
@@ -2490,7 +2698,7 @@
         <p:spPr>
           <a:xfrm>
             <a:off x="0" y="-35280"/>
-            <a:ext cx="9141840" cy="6932160"/>
+            <a:ext cx="9141480" cy="6931800"/>
           </a:xfrm>
           <a:prstGeom prst="rect">
             <a:avLst/>
@@ -2509,7 +2717,7 @@
         <p:spPr>
           <a:xfrm>
             <a:off x="0" y="152280"/>
-            <a:ext cx="1445760" cy="1198080"/>
+            <a:ext cx="1445400" cy="1197720"/>
           </a:xfrm>
           <a:prstGeom prst="rect">
             <a:avLst/>
@@ -2586,7 +2794,7 @@
         <p:spPr>
           <a:xfrm>
             <a:off x="179640" y="138600"/>
-            <a:ext cx="866520" cy="969840"/>
+            <a:ext cx="866160" cy="969480"/>
           </a:xfrm>
           <a:prstGeom prst="rect">
             <a:avLst/>
@@ -2609,7 +2817,7 @@
         <p:spPr>
           <a:xfrm>
             <a:off x="2702520" y="103320"/>
-            <a:ext cx="1618920" cy="988560"/>
+            <a:ext cx="1618560" cy="988200"/>
           </a:xfrm>
           <a:prstGeom prst="rect">
             <a:avLst/>
@@ -2632,7 +2840,7 @@
         <p:spPr>
           <a:xfrm>
             <a:off x="4323600" y="106560"/>
-            <a:ext cx="1617840" cy="986400"/>
+            <a:ext cx="1617480" cy="986040"/>
           </a:xfrm>
           <a:prstGeom prst="rect">
             <a:avLst/>
@@ -2655,7 +2863,7 @@
         <p:spPr>
           <a:xfrm>
             <a:off x="5923800" y="117000"/>
-            <a:ext cx="1617840" cy="987840"/>
+            <a:ext cx="1617480" cy="987480"/>
           </a:xfrm>
           <a:prstGeom prst="rect">
             <a:avLst/>
@@ -2678,7 +2886,7 @@
         <p:spPr>
           <a:xfrm>
             <a:off x="7524000" y="111960"/>
-            <a:ext cx="1617840" cy="987840"/>
+            <a:ext cx="1617480" cy="987480"/>
           </a:xfrm>
           <a:prstGeom prst="rect">
             <a:avLst/>
@@ -2701,7 +2909,7 @@
         <p:spPr>
           <a:xfrm>
             <a:off x="1219320" y="102240"/>
-            <a:ext cx="1617840" cy="987840"/>
+            <a:ext cx="1617480" cy="987480"/>
           </a:xfrm>
           <a:prstGeom prst="rect">
             <a:avLst/>
@@ -2724,7 +2932,7 @@
         <p:spPr>
           <a:xfrm>
             <a:off x="7530120" y="1600200"/>
-            <a:ext cx="1598040" cy="5124960"/>
+            <a:ext cx="1597680" cy="5124600"/>
           </a:xfrm>
           <a:prstGeom prst="rect">
             <a:avLst/>
@@ -2996,7 +3204,7 @@
         <p:spPr>
           <a:xfrm>
             <a:off x="1413000" y="2228400"/>
-            <a:ext cx="6309720" cy="705960"/>
+            <a:ext cx="6309360" cy="705600"/>
           </a:xfrm>
           <a:prstGeom prst="rect">
             <a:avLst/>
@@ -3057,7 +3265,7 @@
         <p:spPr>
           <a:xfrm>
             <a:off x="345600" y="3850560"/>
-            <a:ext cx="8456040" cy="2004120"/>
+            <a:ext cx="8455680" cy="2003760"/>
           </a:xfrm>
           <a:prstGeom prst="rect">
             <a:avLst/>
@@ -3340,7 +3548,7 @@
         <p:spPr>
           <a:xfrm>
             <a:off x="1523880" y="1581120"/>
-            <a:ext cx="7617960" cy="34200"/>
+            <a:ext cx="7617600" cy="33840"/>
           </a:xfrm>
           <a:prstGeom prst="rect">
             <a:avLst/>
@@ -3368,7 +3576,7 @@
         <p:spPr>
           <a:xfrm>
             <a:off x="1371600" y="1143000"/>
-            <a:ext cx="7770240" cy="459360"/>
+            <a:ext cx="7769880" cy="459000"/>
           </a:xfrm>
           <a:prstGeom prst="rect">
             <a:avLst/>
@@ -3389,7 +3597,7 @@
             <a:noAutofit/>
           </a:bodyPr>
           <a:p>
-            <a:pPr marL="343080" indent="-340560" algn="r">
+            <a:pPr marL="343080" indent="-340200" algn="r">
               <a:lnSpc>
                 <a:spcPct val="100000"/>
               </a:lnSpc>
@@ -3419,7 +3627,7 @@
         <p:spPr>
           <a:xfrm>
             <a:off x="505800" y="1617840"/>
-            <a:ext cx="6866280" cy="4756680"/>
+            <a:ext cx="6865920" cy="4756320"/>
           </a:xfrm>
           <a:prstGeom prst="rect">
             <a:avLst/>
@@ -3449,7 +3657,7 @@
         <p:spPr>
           <a:xfrm>
             <a:off x="288000" y="1728000"/>
-            <a:ext cx="7272000" cy="4896000"/>
+            <a:ext cx="7271640" cy="4895640"/>
           </a:xfrm>
           <a:prstGeom prst="rect">
             <a:avLst/>
@@ -3498,7 +3706,7 @@
         <p:spPr>
           <a:xfrm>
             <a:off x="1523880" y="1581120"/>
-            <a:ext cx="7617960" cy="34200"/>
+            <a:ext cx="7617600" cy="33840"/>
           </a:xfrm>
           <a:prstGeom prst="rect">
             <a:avLst/>
@@ -3526,7 +3734,7 @@
         <p:spPr>
           <a:xfrm>
             <a:off x="1371600" y="1143000"/>
-            <a:ext cx="7770240" cy="459360"/>
+            <a:ext cx="7769880" cy="459000"/>
           </a:xfrm>
           <a:prstGeom prst="rect">
             <a:avLst/>
@@ -3547,7 +3755,7 @@
             <a:noAutofit/>
           </a:bodyPr>
           <a:p>
-            <a:pPr marL="343080" indent="-340560" algn="r">
+            <a:pPr marL="343080" indent="-340200" algn="r">
               <a:lnSpc>
                 <a:spcPct val="100000"/>
               </a:lnSpc>
@@ -3577,7 +3785,7 @@
         <p:spPr>
           <a:xfrm>
             <a:off x="505800" y="1617840"/>
-            <a:ext cx="6866280" cy="4756680"/>
+            <a:ext cx="6865920" cy="4756320"/>
           </a:xfrm>
           <a:prstGeom prst="rect">
             <a:avLst/>
@@ -3607,7 +3815,7 @@
         <p:spPr>
           <a:xfrm>
             <a:off x="144360" y="2719080"/>
-            <a:ext cx="7227720" cy="2248200"/>
+            <a:ext cx="7227360" cy="2247840"/>
           </a:xfrm>
           <a:prstGeom prst="rect">
             <a:avLst/>
@@ -3656,7 +3864,7 @@
         <p:spPr>
           <a:xfrm>
             <a:off x="1523880" y="1581120"/>
-            <a:ext cx="7617960" cy="34560"/>
+            <a:ext cx="7617600" cy="34200"/>
           </a:xfrm>
           <a:prstGeom prst="rect">
             <a:avLst/>
@@ -3684,7 +3892,7 @@
         <p:spPr>
           <a:xfrm>
             <a:off x="1371600" y="1143000"/>
-            <a:ext cx="7770240" cy="459720"/>
+            <a:ext cx="7769880" cy="459360"/>
           </a:xfrm>
           <a:prstGeom prst="rect">
             <a:avLst/>
@@ -3705,7 +3913,7 @@
             <a:noAutofit/>
           </a:bodyPr>
           <a:p>
-            <a:pPr marL="343080" indent="-340560" algn="r">
+            <a:pPr marL="343080" indent="-340200" algn="r">
               <a:lnSpc>
                 <a:spcPct val="100000"/>
               </a:lnSpc>
@@ -3735,7 +3943,7 @@
         <p:spPr>
           <a:xfrm>
             <a:off x="533520" y="2678760"/>
-            <a:ext cx="6861600" cy="3872160"/>
+            <a:ext cx="6861240" cy="3871800"/>
           </a:xfrm>
           <a:prstGeom prst="rect">
             <a:avLst/>
@@ -3756,7 +3964,7 @@
             <a:noAutofit/>
           </a:bodyPr>
           <a:p>
-            <a:pPr marL="285840" indent="-284760" algn="just">
+            <a:pPr marL="285840" indent="-284400" algn="just">
               <a:lnSpc>
                 <a:spcPct val="150000"/>
               </a:lnSpc>
@@ -3781,7 +3989,7 @@
             </a:endParaRPr>
           </a:p>
           <a:p>
-            <a:pPr marL="285840" indent="-284760" algn="just">
+            <a:pPr marL="285840" indent="-284400" algn="just">
               <a:lnSpc>
                 <a:spcPct val="150000"/>
               </a:lnSpc>
@@ -3806,7 +4014,7 @@
             </a:endParaRPr>
           </a:p>
           <a:p>
-            <a:pPr marL="285840" indent="-284760" algn="just">
+            <a:pPr marL="285840" indent="-284400" algn="just">
               <a:lnSpc>
                 <a:spcPct val="150000"/>
               </a:lnSpc>
@@ -3871,7 +4079,7 @@
         <p:spPr>
           <a:xfrm>
             <a:off x="1523880" y="1581120"/>
-            <a:ext cx="7617960" cy="34560"/>
+            <a:ext cx="7617600" cy="34200"/>
           </a:xfrm>
           <a:prstGeom prst="rect">
             <a:avLst/>
@@ -3899,7 +4107,7 @@
         <p:spPr>
           <a:xfrm>
             <a:off x="1371600" y="1143000"/>
-            <a:ext cx="7770240" cy="459720"/>
+            <a:ext cx="7769880" cy="459360"/>
           </a:xfrm>
           <a:prstGeom prst="rect">
             <a:avLst/>
@@ -3920,7 +4128,7 @@
             <a:noAutofit/>
           </a:bodyPr>
           <a:p>
-            <a:pPr marL="343080" indent="-340560" algn="r">
+            <a:pPr marL="343080" indent="-340200" algn="r">
               <a:lnSpc>
                 <a:spcPct val="100000"/>
               </a:lnSpc>
@@ -3954,7 +4162,7 @@
         <p:spPr>
           <a:xfrm>
             <a:off x="288000" y="1728000"/>
-            <a:ext cx="7272000" cy="4896000"/>
+            <a:ext cx="7271640" cy="4895640"/>
           </a:xfrm>
           <a:prstGeom prst="rect">
             <a:avLst/>
@@ -4003,7 +4211,7 @@
         <p:spPr>
           <a:xfrm>
             <a:off x="1523880" y="1581120"/>
-            <a:ext cx="7617960" cy="34560"/>
+            <a:ext cx="7617600" cy="34200"/>
           </a:xfrm>
           <a:prstGeom prst="rect">
             <a:avLst/>
@@ -4031,7 +4239,7 @@
         <p:spPr>
           <a:xfrm>
             <a:off x="1371600" y="1143000"/>
-            <a:ext cx="7770240" cy="459720"/>
+            <a:ext cx="7769880" cy="459360"/>
           </a:xfrm>
           <a:prstGeom prst="rect">
             <a:avLst/>
@@ -4052,7 +4260,7 @@
             <a:noAutofit/>
           </a:bodyPr>
           <a:p>
-            <a:pPr marL="343080" indent="-340560" algn="r">
+            <a:pPr marL="343080" indent="-340200" algn="r">
               <a:lnSpc>
                 <a:spcPct val="100000"/>
               </a:lnSpc>
@@ -4086,7 +4294,7 @@
         <p:spPr>
           <a:xfrm>
             <a:off x="238680" y="1656000"/>
-            <a:ext cx="7536600" cy="4967280"/>
+            <a:ext cx="7536240" cy="4966920"/>
           </a:xfrm>
           <a:prstGeom prst="rect">
             <a:avLst/>
@@ -4135,7 +4343,7 @@
         <p:spPr>
           <a:xfrm>
             <a:off x="1523880" y="1581120"/>
-            <a:ext cx="7617960" cy="34560"/>
+            <a:ext cx="7617600" cy="34200"/>
           </a:xfrm>
           <a:prstGeom prst="rect">
             <a:avLst/>
@@ -4163,7 +4371,7 @@
         <p:spPr>
           <a:xfrm>
             <a:off x="1371600" y="1143000"/>
-            <a:ext cx="7770240" cy="459720"/>
+            <a:ext cx="7769880" cy="459360"/>
           </a:xfrm>
           <a:prstGeom prst="rect">
             <a:avLst/>
@@ -4184,7 +4392,7 @@
             <a:noAutofit/>
           </a:bodyPr>
           <a:p>
-            <a:pPr marL="343080" indent="-340560" algn="r">
+            <a:pPr marL="343080" indent="-340200" algn="r">
               <a:lnSpc>
                 <a:spcPct val="100000"/>
               </a:lnSpc>
@@ -4197,7 +4405,7 @@
                 <a:latin typeface="Times New Roman"/>
                 <a:ea typeface="Trebuchet MS"/>
               </a:rPr>
-              <a:t>Policy and Algorithm 2 of 2 (Frequent Transfer)</a:t>
+              <a:t>Policy and Algorithm 1 of 2 (Infrequent Transfer)</a:t>
             </a:r>
             <a:endParaRPr b="0" lang="en-IN" sz="2400" spc="-1" strike="noStrike">
               <a:latin typeface="Arial"/>
@@ -4213,12 +4421,13 @@
         </p:nvPicPr>
         <p:blipFill>
           <a:blip r:embed="rId1"/>
+          <a:srcRect l="0" t="5802" r="46821" b="3202"/>
           <a:stretch/>
         </p:blipFill>
         <p:spPr>
           <a:xfrm>
-            <a:off x="166680" y="1656000"/>
-            <a:ext cx="7536600" cy="4979880"/>
+            <a:off x="1473840" y="1800360"/>
+            <a:ext cx="4862160" cy="4679640"/>
           </a:xfrm>
           <a:prstGeom prst="rect">
             <a:avLst/>
@@ -4267,7 +4476,7 @@
         <p:spPr>
           <a:xfrm>
             <a:off x="1523880" y="1581120"/>
-            <a:ext cx="7617960" cy="34560"/>
+            <a:ext cx="7617600" cy="34200"/>
           </a:xfrm>
           <a:prstGeom prst="rect">
             <a:avLst/>
@@ -4295,7 +4504,7 @@
         <p:spPr>
           <a:xfrm>
             <a:off x="1371600" y="1143000"/>
-            <a:ext cx="7770240" cy="459720"/>
+            <a:ext cx="7769880" cy="459360"/>
           </a:xfrm>
           <a:prstGeom prst="rect">
             <a:avLst/>
@@ -4316,7 +4525,7 @@
             <a:noAutofit/>
           </a:bodyPr>
           <a:p>
-            <a:pPr marL="343080" indent="-340560" algn="r">
+            <a:pPr marL="343080" indent="-340200" algn="r">
               <a:lnSpc>
                 <a:spcPct val="100000"/>
               </a:lnSpc>
@@ -4329,7 +4538,7 @@
                 <a:latin typeface="Times New Roman"/>
                 <a:ea typeface="Trebuchet MS"/>
               </a:rPr>
-              <a:t>Technologies Used</a:t>
+              <a:t>Policy and Algorithm 2 of 2 (Frequent Transfer)</a:t>
             </a:r>
             <a:endParaRPr b="0" lang="en-IN" sz="2400" spc="-1" strike="noStrike">
               <a:latin typeface="Arial"/>
@@ -4337,132 +4546,29 @@
           </a:p>
         </p:txBody>
       </p:sp>
-      <p:sp>
-        <p:nvSpPr>
-          <p:cNvPr id="102" name="CustomShape 3"/>
-          <p:cNvSpPr/>
+      <p:pic>
+        <p:nvPicPr>
+          <p:cNvPr id="102" name="" descr=""/>
+          <p:cNvPicPr/>
           <p:nvPr/>
-        </p:nvSpPr>
-        <p:spPr>
-          <a:xfrm>
-            <a:off x="480960" y="1728000"/>
-            <a:ext cx="6861600" cy="4722120"/>
-          </a:xfrm>
-          <a:prstGeom prst="rect">
-            <a:avLst/>
-          </a:prstGeom>
-          <a:noFill/>
+        </p:nvPicPr>
+        <p:blipFill>
+          <a:blip r:embed="rId1"/>
+          <a:stretch/>
+        </p:blipFill>
+        <p:spPr>
+          <a:xfrm>
+            <a:off x="166680" y="1656000"/>
+            <a:ext cx="7536240" cy="4979520"/>
+          </a:xfrm>
+          <a:prstGeom prst="rect">
+            <a:avLst/>
+          </a:prstGeom>
           <a:ln>
             <a:noFill/>
           </a:ln>
         </p:spPr>
-        <p:style>
-          <a:lnRef idx="0"/>
-          <a:fillRef idx="0"/>
-          <a:effectRef idx="0"/>
-          <a:fontRef idx="minor"/>
-        </p:style>
-        <p:txBody>
-          <a:bodyPr lIns="90000" rIns="90000" tIns="45000" bIns="45000" anchor="ctr">
-            <a:noAutofit/>
-          </a:bodyPr>
-          <a:p>
-            <a:pPr marL="285840" indent="-284760" algn="just">
-              <a:lnSpc>
-                <a:spcPct val="100000"/>
-              </a:lnSpc>
-              <a:buClr>
-                <a:srgbClr val="000000"/>
-              </a:buClr>
-              <a:buFont typeface="Arial"/>
-              <a:buChar char="•"/>
-            </a:pPr>
-            <a:r>
-              <a:rPr b="0" lang="en-IN" sz="1800" spc="-1" strike="noStrike">
-                <a:solidFill>
-                  <a:srgbClr val="000000"/>
-                </a:solidFill>
-                <a:latin typeface="Arial"/>
-                <a:ea typeface="Arial"/>
-              </a:rPr>
-              <a:t>HDFS replication simulator</a:t>
-            </a:r>
-            <a:endParaRPr b="0" lang="en-IN" sz="1800" spc="-1" strike="noStrike">
-              <a:latin typeface="Arial"/>
-            </a:endParaRPr>
-          </a:p>
-          <a:p>
-            <a:pPr algn="just">
-              <a:lnSpc>
-                <a:spcPct val="100000"/>
-              </a:lnSpc>
-            </a:pPr>
-            <a:endParaRPr b="0" lang="en-IN" sz="1800" spc="-1" strike="noStrike">
-              <a:latin typeface="Arial"/>
-            </a:endParaRPr>
-          </a:p>
-          <a:p>
-            <a:pPr marL="285840" indent="-284760" algn="just">
-              <a:lnSpc>
-                <a:spcPct val="100000"/>
-              </a:lnSpc>
-              <a:buClr>
-                <a:srgbClr val="000000"/>
-              </a:buClr>
-              <a:buFont typeface="Arial"/>
-              <a:buChar char="•"/>
-            </a:pPr>
-            <a:r>
-              <a:rPr b="0" lang="en-IN" sz="1800" spc="-1" strike="noStrike">
-                <a:solidFill>
-                  <a:srgbClr val="000000"/>
-                </a:solidFill>
-                <a:latin typeface="Arial"/>
-                <a:ea typeface="Arial"/>
-              </a:rPr>
-              <a:t>Java</a:t>
-            </a:r>
-            <a:endParaRPr b="0" lang="en-IN" sz="1800" spc="-1" strike="noStrike">
-              <a:latin typeface="Arial"/>
-            </a:endParaRPr>
-          </a:p>
-          <a:p>
-            <a:pPr algn="just">
-              <a:lnSpc>
-                <a:spcPct val="100000"/>
-              </a:lnSpc>
-            </a:pPr>
-            <a:endParaRPr b="0" lang="en-IN" sz="1800" spc="-1" strike="noStrike">
-              <a:latin typeface="Arial"/>
-            </a:endParaRPr>
-          </a:p>
-          <a:p>
-            <a:pPr marL="285840" indent="-284760" algn="just">
-              <a:lnSpc>
-                <a:spcPct val="100000"/>
-              </a:lnSpc>
-              <a:buClr>
-                <a:srgbClr val="000000"/>
-              </a:buClr>
-              <a:buFont typeface="Arial"/>
-              <a:buChar char="•"/>
-            </a:pPr>
-            <a:r>
-              <a:rPr b="0" lang="en-IN" sz="1800" spc="-1" strike="noStrike">
-                <a:solidFill>
-                  <a:srgbClr val="000000"/>
-                </a:solidFill>
-                <a:latin typeface="Arial"/>
-                <a:ea typeface="Arial"/>
-              </a:rPr>
-              <a:t>Draw.io</a:t>
-            </a:r>
-            <a:endParaRPr b="0" lang="en-IN" sz="1800" spc="-1" strike="noStrike">
-              <a:latin typeface="Arial"/>
-            </a:endParaRPr>
-          </a:p>
-        </p:txBody>
-      </p:sp>
+      </p:pic>
     </p:spTree>
   </p:cSld>
   <mc:AlternateContent>
@@ -4501,8 +4607,376 @@
         </p:nvSpPr>
         <p:spPr>
           <a:xfrm>
+            <a:off x="1523880" y="1581120"/>
+            <a:ext cx="7617600" cy="34200"/>
+          </a:xfrm>
+          <a:prstGeom prst="rect">
+            <a:avLst/>
+          </a:prstGeom>
+          <a:solidFill>
+            <a:srgbClr val="33cccc"/>
+          </a:solidFill>
+          <a:ln>
+            <a:noFill/>
+          </a:ln>
+        </p:spPr>
+        <p:style>
+          <a:lnRef idx="0"/>
+          <a:fillRef idx="0"/>
+          <a:effectRef idx="0"/>
+          <a:fontRef idx="minor"/>
+        </p:style>
+      </p:sp>
+      <p:sp>
+        <p:nvSpPr>
+          <p:cNvPr id="104" name="CustomShape 2"/>
+          <p:cNvSpPr/>
+          <p:nvPr/>
+        </p:nvSpPr>
+        <p:spPr>
+          <a:xfrm>
+            <a:off x="1371600" y="1143000"/>
+            <a:ext cx="7769880" cy="459360"/>
+          </a:xfrm>
+          <a:prstGeom prst="rect">
+            <a:avLst/>
+          </a:prstGeom>
+          <a:noFill/>
+          <a:ln>
+            <a:noFill/>
+          </a:ln>
+        </p:spPr>
+        <p:style>
+          <a:lnRef idx="0"/>
+          <a:fillRef idx="0"/>
+          <a:effectRef idx="0"/>
+          <a:fontRef idx="minor"/>
+        </p:style>
+        <p:txBody>
+          <a:bodyPr lIns="90000" rIns="90000" tIns="45000" bIns="45000">
+            <a:noAutofit/>
+          </a:bodyPr>
+          <a:p>
+            <a:pPr marL="343080" indent="-340200" algn="r">
+              <a:lnSpc>
+                <a:spcPct val="100000"/>
+              </a:lnSpc>
+            </a:pPr>
+            <a:r>
+              <a:rPr b="1" lang="en-IN" sz="2400" spc="-1" strike="noStrike">
+                <a:solidFill>
+                  <a:srgbClr val="ff0000"/>
+                </a:solidFill>
+                <a:latin typeface="Times New Roman"/>
+                <a:ea typeface="Trebuchet MS"/>
+              </a:rPr>
+              <a:t>Policy and Algorithm 2 of 2 (Frequent Transfer)</a:t>
+            </a:r>
+            <a:endParaRPr b="0" lang="en-IN" sz="2400" spc="-1" strike="noStrike">
+              <a:latin typeface="Arial"/>
+            </a:endParaRPr>
+          </a:p>
+        </p:txBody>
+      </p:sp>
+      <p:pic>
+        <p:nvPicPr>
+          <p:cNvPr id="105" name="" descr=""/>
+          <p:cNvPicPr/>
+          <p:nvPr/>
+        </p:nvPicPr>
+        <p:blipFill>
+          <a:blip r:embed="rId1"/>
+          <a:srcRect l="0" t="3227" r="52752" b="2803"/>
+          <a:stretch/>
+        </p:blipFill>
+        <p:spPr>
+          <a:xfrm>
+            <a:off x="1440360" y="1728000"/>
+            <a:ext cx="4319640" cy="4832640"/>
+          </a:xfrm>
+          <a:prstGeom prst="rect">
+            <a:avLst/>
+          </a:prstGeom>
+          <a:ln>
+            <a:noFill/>
+          </a:ln>
+        </p:spPr>
+      </p:pic>
+    </p:spTree>
+  </p:cSld>
+  <mc:AlternateContent>
+    <mc:Choice Requires="p14">
+      <p:transition spd="slow" p14:dur="2000"/>
+    </mc:Choice>
+    <mc:Fallback>
+      <p:transition spd="slow"/>
+    </mc:Fallback>
+  </mc:AlternateContent>
+</p:sld>
+</file>
+
+<file path=ppt/slides/slide18.xml><?xml version="1.0" encoding="utf-8"?>
+<p:sld xmlns:a="http://schemas.openxmlformats.org/drawingml/2006/main" xmlns:p="http://schemas.openxmlformats.org/presentationml/2006/main" xmlns:r="http://schemas.openxmlformats.org/officeDocument/2006/relationships" xmlns:p14="http://schemas.microsoft.com/office/powerpoint/2010/main" xmlns:p15="http://schemas.microsoft.com/office/powerpoint/2012/main" xmlns:mc="http://schemas.openxmlformats.org/markup-compatibility/2006">
+  <p:cSld>
+    <p:spTree>
+      <p:nvGrpSpPr>
+        <p:cNvPr id="1" name=""/>
+        <p:cNvGrpSpPr/>
+        <p:nvPr/>
+      </p:nvGrpSpPr>
+      <p:grpSpPr>
+        <a:xfrm>
+          <a:off x="0" y="0"/>
+          <a:ext cx="0" cy="0"/>
+          <a:chOff x="0" y="0"/>
+          <a:chExt cx="0" cy="0"/>
+        </a:xfrm>
+      </p:grpSpPr>
+      <p:sp>
+        <p:nvSpPr>
+          <p:cNvPr id="106" name="CustomShape 1"/>
+          <p:cNvSpPr/>
+          <p:nvPr/>
+        </p:nvSpPr>
+        <p:spPr>
+          <a:xfrm>
+            <a:off x="1523880" y="1581120"/>
+            <a:ext cx="7617600" cy="34200"/>
+          </a:xfrm>
+          <a:prstGeom prst="rect">
+            <a:avLst/>
+          </a:prstGeom>
+          <a:solidFill>
+            <a:srgbClr val="33cccc"/>
+          </a:solidFill>
+          <a:ln>
+            <a:noFill/>
+          </a:ln>
+        </p:spPr>
+        <p:style>
+          <a:lnRef idx="0"/>
+          <a:fillRef idx="0"/>
+          <a:effectRef idx="0"/>
+          <a:fontRef idx="minor"/>
+        </p:style>
+      </p:sp>
+      <p:sp>
+        <p:nvSpPr>
+          <p:cNvPr id="107" name="CustomShape 2"/>
+          <p:cNvSpPr/>
+          <p:nvPr/>
+        </p:nvSpPr>
+        <p:spPr>
+          <a:xfrm>
+            <a:off x="1371600" y="1143000"/>
+            <a:ext cx="7769880" cy="459360"/>
+          </a:xfrm>
+          <a:prstGeom prst="rect">
+            <a:avLst/>
+          </a:prstGeom>
+          <a:noFill/>
+          <a:ln>
+            <a:noFill/>
+          </a:ln>
+        </p:spPr>
+        <p:style>
+          <a:lnRef idx="0"/>
+          <a:fillRef idx="0"/>
+          <a:effectRef idx="0"/>
+          <a:fontRef idx="minor"/>
+        </p:style>
+        <p:txBody>
+          <a:bodyPr lIns="90000" rIns="90000" tIns="45000" bIns="45000">
+            <a:noAutofit/>
+          </a:bodyPr>
+          <a:p>
+            <a:pPr marL="343080" indent="-340200" algn="r">
+              <a:lnSpc>
+                <a:spcPct val="100000"/>
+              </a:lnSpc>
+            </a:pPr>
+            <a:r>
+              <a:rPr b="1" lang="en-IN" sz="2400" spc="-1" strike="noStrike">
+                <a:solidFill>
+                  <a:srgbClr val="ff0000"/>
+                </a:solidFill>
+                <a:latin typeface="Times New Roman"/>
+                <a:ea typeface="Trebuchet MS"/>
+              </a:rPr>
+              <a:t>Technologies Used</a:t>
+            </a:r>
+            <a:endParaRPr b="0" lang="en-IN" sz="2400" spc="-1" strike="noStrike">
+              <a:latin typeface="Arial"/>
+            </a:endParaRPr>
+          </a:p>
+        </p:txBody>
+      </p:sp>
+      <p:sp>
+        <p:nvSpPr>
+          <p:cNvPr id="108" name="CustomShape 3"/>
+          <p:cNvSpPr/>
+          <p:nvPr/>
+        </p:nvSpPr>
+        <p:spPr>
+          <a:xfrm>
+            <a:off x="480960" y="1728000"/>
+            <a:ext cx="6861240" cy="4721760"/>
+          </a:xfrm>
+          <a:prstGeom prst="rect">
+            <a:avLst/>
+          </a:prstGeom>
+          <a:noFill/>
+          <a:ln>
+            <a:noFill/>
+          </a:ln>
+        </p:spPr>
+        <p:style>
+          <a:lnRef idx="0"/>
+          <a:fillRef idx="0"/>
+          <a:effectRef idx="0"/>
+          <a:fontRef idx="minor"/>
+        </p:style>
+        <p:txBody>
+          <a:bodyPr lIns="90000" rIns="90000" tIns="45000" bIns="45000" anchor="ctr">
+            <a:noAutofit/>
+          </a:bodyPr>
+          <a:p>
+            <a:pPr marL="285840" indent="-284400" algn="just">
+              <a:lnSpc>
+                <a:spcPct val="100000"/>
+              </a:lnSpc>
+              <a:buClr>
+                <a:srgbClr val="000000"/>
+              </a:buClr>
+              <a:buFont typeface="Arial"/>
+              <a:buChar char="•"/>
+            </a:pPr>
+            <a:r>
+              <a:rPr b="0" lang="en-IN" sz="1800" spc="-1" strike="noStrike">
+                <a:solidFill>
+                  <a:srgbClr val="000000"/>
+                </a:solidFill>
+                <a:latin typeface="Arial"/>
+                <a:ea typeface="Arial"/>
+              </a:rPr>
+              <a:t>HDFS replication simulator</a:t>
+            </a:r>
+            <a:endParaRPr b="0" lang="en-IN" sz="1800" spc="-1" strike="noStrike">
+              <a:latin typeface="Arial"/>
+            </a:endParaRPr>
+          </a:p>
+          <a:p>
+            <a:pPr algn="just">
+              <a:lnSpc>
+                <a:spcPct val="100000"/>
+              </a:lnSpc>
+            </a:pPr>
+            <a:endParaRPr b="0" lang="en-IN" sz="1800" spc="-1" strike="noStrike">
+              <a:latin typeface="Arial"/>
+            </a:endParaRPr>
+          </a:p>
+          <a:p>
+            <a:pPr marL="285840" indent="-284400" algn="just">
+              <a:lnSpc>
+                <a:spcPct val="100000"/>
+              </a:lnSpc>
+              <a:buClr>
+                <a:srgbClr val="000000"/>
+              </a:buClr>
+              <a:buFont typeface="Arial"/>
+              <a:buChar char="•"/>
+            </a:pPr>
+            <a:r>
+              <a:rPr b="0" lang="en-IN" sz="1800" spc="-1" strike="noStrike">
+                <a:solidFill>
+                  <a:srgbClr val="000000"/>
+                </a:solidFill>
+                <a:latin typeface="Arial"/>
+                <a:ea typeface="Arial"/>
+              </a:rPr>
+              <a:t>Java</a:t>
+            </a:r>
+            <a:endParaRPr b="0" lang="en-IN" sz="1800" spc="-1" strike="noStrike">
+              <a:latin typeface="Arial"/>
+            </a:endParaRPr>
+          </a:p>
+          <a:p>
+            <a:pPr algn="just">
+              <a:lnSpc>
+                <a:spcPct val="100000"/>
+              </a:lnSpc>
+            </a:pPr>
+            <a:endParaRPr b="0" lang="en-IN" sz="1800" spc="-1" strike="noStrike">
+              <a:latin typeface="Arial"/>
+            </a:endParaRPr>
+          </a:p>
+          <a:p>
+            <a:pPr marL="285840" indent="-284400" algn="just">
+              <a:lnSpc>
+                <a:spcPct val="100000"/>
+              </a:lnSpc>
+              <a:buClr>
+                <a:srgbClr val="000000"/>
+              </a:buClr>
+              <a:buFont typeface="Arial"/>
+              <a:buChar char="•"/>
+            </a:pPr>
+            <a:r>
+              <a:rPr b="0" lang="en-IN" sz="1800" spc="-1" strike="noStrike">
+                <a:solidFill>
+                  <a:srgbClr val="000000"/>
+                </a:solidFill>
+                <a:latin typeface="Arial"/>
+                <a:ea typeface="Arial"/>
+              </a:rPr>
+              <a:t>Draw.io</a:t>
+            </a:r>
+            <a:endParaRPr b="0" lang="en-IN" sz="1800" spc="-1" strike="noStrike">
+              <a:latin typeface="Arial"/>
+            </a:endParaRPr>
+          </a:p>
+        </p:txBody>
+      </p:sp>
+    </p:spTree>
+  </p:cSld>
+  <mc:AlternateContent>
+    <mc:Choice Requires="p14">
+      <p:transition spd="slow" p14:dur="2000"/>
+    </mc:Choice>
+    <mc:Fallback>
+      <p:transition spd="slow"/>
+    </mc:Fallback>
+  </mc:AlternateContent>
+</p:sld>
+</file>
+
+<file path=ppt/slides/slide19.xml><?xml version="1.0" encoding="utf-8"?>
+<p:sld xmlns:a="http://schemas.openxmlformats.org/drawingml/2006/main" xmlns:p="http://schemas.openxmlformats.org/presentationml/2006/main" xmlns:r="http://schemas.openxmlformats.org/officeDocument/2006/relationships" xmlns:p14="http://schemas.microsoft.com/office/powerpoint/2010/main" xmlns:p15="http://schemas.microsoft.com/office/powerpoint/2012/main" xmlns:mc="http://schemas.openxmlformats.org/markup-compatibility/2006">
+  <p:cSld>
+    <p:spTree>
+      <p:nvGrpSpPr>
+        <p:cNvPr id="1" name=""/>
+        <p:cNvGrpSpPr/>
+        <p:nvPr/>
+      </p:nvGrpSpPr>
+      <p:grpSpPr>
+        <a:xfrm>
+          <a:off x="0" y="0"/>
+          <a:ext cx="0" cy="0"/>
+          <a:chOff x="0" y="0"/>
+          <a:chExt cx="0" cy="0"/>
+        </a:xfrm>
+      </p:grpSpPr>
+      <p:sp>
+        <p:nvSpPr>
+          <p:cNvPr id="109" name="CustomShape 1"/>
+          <p:cNvSpPr/>
+          <p:nvPr/>
+        </p:nvSpPr>
+        <p:spPr>
+          <a:xfrm>
             <a:off x="2847600" y="3352680"/>
-            <a:ext cx="2921760" cy="705600"/>
+            <a:ext cx="2921400" cy="705240"/>
           </a:xfrm>
           <a:prstGeom prst="rect">
             <a:avLst/>
@@ -4583,7 +5057,7 @@
         <p:spPr>
           <a:xfrm>
             <a:off x="1523880" y="1581120"/>
-            <a:ext cx="7617960" cy="34200"/>
+            <a:ext cx="7617600" cy="33840"/>
           </a:xfrm>
           <a:prstGeom prst="rect">
             <a:avLst/>
@@ -4611,7 +5085,7 @@
         <p:spPr>
           <a:xfrm>
             <a:off x="2666880" y="1143000"/>
-            <a:ext cx="6474960" cy="459360"/>
+            <a:ext cx="6474600" cy="459000"/>
           </a:xfrm>
           <a:prstGeom prst="rect">
             <a:avLst/>
@@ -4632,7 +5106,7 @@
             <a:noAutofit/>
           </a:bodyPr>
           <a:p>
-            <a:pPr marL="343080" indent="-340560" algn="r">
+            <a:pPr marL="343080" indent="-340200" algn="r">
               <a:lnSpc>
                 <a:spcPct val="100000"/>
               </a:lnSpc>
@@ -4662,7 +5136,7 @@
         <p:spPr>
           <a:xfrm>
             <a:off x="173160" y="1767960"/>
-            <a:ext cx="7455240" cy="4283280"/>
+            <a:ext cx="7454880" cy="4282920"/>
           </a:xfrm>
           <a:prstGeom prst="rect">
             <a:avLst/>
@@ -4703,7 +5177,7 @@
             </a:endParaRPr>
           </a:p>
           <a:p>
-            <a:pPr marL="527040" indent="-284760">
+            <a:pPr marL="527040" indent="-284400">
               <a:lnSpc>
                 <a:spcPct val="150000"/>
               </a:lnSpc>
@@ -4728,7 +5202,7 @@
             </a:endParaRPr>
           </a:p>
           <a:p>
-            <a:pPr marL="527040" indent="-284760">
+            <a:pPr marL="527040" indent="-284400">
               <a:lnSpc>
                 <a:spcPct val="150000"/>
               </a:lnSpc>
@@ -4753,7 +5227,7 @@
             </a:endParaRPr>
           </a:p>
           <a:p>
-            <a:pPr marL="527040" indent="-284760">
+            <a:pPr marL="527040" indent="-284400">
               <a:lnSpc>
                 <a:spcPct val="150000"/>
               </a:lnSpc>
@@ -4778,7 +5252,7 @@
             </a:endParaRPr>
           </a:p>
           <a:p>
-            <a:pPr marL="527040" indent="-284760">
+            <a:pPr marL="527040" indent="-284400">
               <a:lnSpc>
                 <a:spcPct val="150000"/>
               </a:lnSpc>
@@ -4843,7 +5317,7 @@
         <p:spPr>
           <a:xfrm>
             <a:off x="1523880" y="1581120"/>
-            <a:ext cx="7617960" cy="34200"/>
+            <a:ext cx="7617600" cy="33840"/>
           </a:xfrm>
           <a:prstGeom prst="rect">
             <a:avLst/>
@@ -4871,7 +5345,7 @@
         <p:spPr>
           <a:xfrm>
             <a:off x="2666880" y="1143000"/>
-            <a:ext cx="6474960" cy="459360"/>
+            <a:ext cx="6474600" cy="459000"/>
           </a:xfrm>
           <a:prstGeom prst="rect">
             <a:avLst/>
@@ -4892,7 +5366,7 @@
             <a:noAutofit/>
           </a:bodyPr>
           <a:p>
-            <a:pPr marL="343080" indent="-340560" algn="r">
+            <a:pPr marL="343080" indent="-340200" algn="r">
               <a:lnSpc>
                 <a:spcPct val="100000"/>
               </a:lnSpc>
@@ -4922,7 +5396,7 @@
         <p:spPr>
           <a:xfrm>
             <a:off x="0" y="1617840"/>
-            <a:ext cx="7702920" cy="4334400"/>
+            <a:ext cx="7702560" cy="4334040"/>
           </a:xfrm>
           <a:prstGeom prst="rect">
             <a:avLst/>
@@ -4963,7 +5437,7 @@
             </a:endParaRPr>
           </a:p>
           <a:p>
-            <a:pPr marL="527040" indent="-284760">
+            <a:pPr marL="527040" indent="-284400">
               <a:lnSpc>
                 <a:spcPct val="150000"/>
               </a:lnSpc>
@@ -4988,7 +5462,7 @@
             </a:endParaRPr>
           </a:p>
           <a:p>
-            <a:pPr marL="527040" indent="-284760">
+            <a:pPr marL="527040" indent="-284400">
               <a:lnSpc>
                 <a:spcPct val="150000"/>
               </a:lnSpc>
@@ -5013,7 +5487,7 @@
             </a:endParaRPr>
           </a:p>
           <a:p>
-            <a:pPr marL="527040" indent="-284760">
+            <a:pPr marL="527040" indent="-284400">
               <a:lnSpc>
                 <a:spcPct val="150000"/>
               </a:lnSpc>
@@ -5078,7 +5552,7 @@
         <p:spPr>
           <a:xfrm>
             <a:off x="1523880" y="1581120"/>
-            <a:ext cx="7617960" cy="34200"/>
+            <a:ext cx="7617600" cy="33840"/>
           </a:xfrm>
           <a:prstGeom prst="rect">
             <a:avLst/>
@@ -5106,7 +5580,7 @@
         <p:spPr>
           <a:xfrm>
             <a:off x="2666880" y="1143000"/>
-            <a:ext cx="6474960" cy="459360"/>
+            <a:ext cx="6474600" cy="459000"/>
           </a:xfrm>
           <a:prstGeom prst="rect">
             <a:avLst/>
@@ -5127,7 +5601,7 @@
             <a:noAutofit/>
           </a:bodyPr>
           <a:p>
-            <a:pPr marL="343080" indent="-340560" algn="r">
+            <a:pPr marL="343080" indent="-340200" algn="r">
               <a:lnSpc>
                 <a:spcPct val="100000"/>
               </a:lnSpc>
@@ -5157,7 +5631,7 @@
         <p:spPr>
           <a:xfrm>
             <a:off x="360000" y="1656000"/>
-            <a:ext cx="7484760" cy="4838400"/>
+            <a:ext cx="7484400" cy="4838040"/>
           </a:xfrm>
           <a:prstGeom prst="rect">
             <a:avLst/>
@@ -5198,7 +5672,7 @@
             </a:endParaRPr>
           </a:p>
           <a:p>
-            <a:pPr marL="527040" indent="-284760">
+            <a:pPr marL="527040" indent="-284400">
               <a:lnSpc>
                 <a:spcPct val="150000"/>
               </a:lnSpc>
@@ -5304,7 +5778,7 @@
             </a:endParaRPr>
           </a:p>
           <a:p>
-            <a:pPr marL="527040" indent="-284760">
+            <a:pPr marL="527040" indent="-284400">
               <a:lnSpc>
                 <a:spcPct val="150000"/>
               </a:lnSpc>
@@ -5430,7 +5904,7 @@
         <p:spPr>
           <a:xfrm>
             <a:off x="1523880" y="1581120"/>
-            <a:ext cx="7617960" cy="34200"/>
+            <a:ext cx="7617600" cy="33840"/>
           </a:xfrm>
           <a:prstGeom prst="rect">
             <a:avLst/>
@@ -5458,7 +5932,7 @@
         <p:spPr>
           <a:xfrm>
             <a:off x="2666880" y="1143000"/>
-            <a:ext cx="6474960" cy="459360"/>
+            <a:ext cx="6474600" cy="459000"/>
           </a:xfrm>
           <a:prstGeom prst="rect">
             <a:avLst/>
@@ -5479,7 +5953,7 @@
             <a:noAutofit/>
           </a:bodyPr>
           <a:p>
-            <a:pPr marL="343080" indent="-340560" algn="r">
+            <a:pPr marL="343080" indent="-340200" algn="r">
               <a:lnSpc>
                 <a:spcPct val="100000"/>
               </a:lnSpc>
@@ -5509,7 +5983,7 @@
         <p:spPr>
           <a:xfrm>
             <a:off x="360000" y="1656000"/>
-            <a:ext cx="7484760" cy="4838400"/>
+            <a:ext cx="7484400" cy="4838040"/>
           </a:xfrm>
           <a:prstGeom prst="rect">
             <a:avLst/>
@@ -5550,7 +6024,7 @@
             </a:endParaRPr>
           </a:p>
           <a:p>
-            <a:pPr marL="527040" indent="-284760">
+            <a:pPr marL="527040" indent="-284400">
               <a:lnSpc>
                 <a:spcPct val="150000"/>
               </a:lnSpc>
@@ -5656,7 +6130,7 @@
             </a:endParaRPr>
           </a:p>
           <a:p>
-            <a:pPr marL="527040" indent="-284760">
+            <a:pPr marL="527040" indent="-284400">
               <a:lnSpc>
                 <a:spcPct val="150000"/>
               </a:lnSpc>
@@ -5782,7 +6256,7 @@
         <p:spPr>
           <a:xfrm>
             <a:off x="1523880" y="1581120"/>
-            <a:ext cx="7617960" cy="34560"/>
+            <a:ext cx="7617600" cy="34200"/>
           </a:xfrm>
           <a:prstGeom prst="rect">
             <a:avLst/>
@@ -5810,7 +6284,7 @@
         <p:spPr>
           <a:xfrm>
             <a:off x="1371600" y="1143000"/>
-            <a:ext cx="7770240" cy="459720"/>
+            <a:ext cx="7769880" cy="459360"/>
           </a:xfrm>
           <a:prstGeom prst="rect">
             <a:avLst/>
@@ -5831,7 +6305,7 @@
             <a:noAutofit/>
           </a:bodyPr>
           <a:p>
-            <a:pPr marL="343080" indent="-340560" algn="r">
+            <a:pPr marL="343080" indent="-340200" algn="r">
               <a:lnSpc>
                 <a:spcPct val="100000"/>
               </a:lnSpc>
@@ -5861,7 +6335,7 @@
         <p:spPr>
           <a:xfrm>
             <a:off x="516960" y="2133720"/>
-            <a:ext cx="7003440" cy="3731040"/>
+            <a:ext cx="7003080" cy="3730680"/>
           </a:xfrm>
           <a:prstGeom prst="rect">
             <a:avLst/>
@@ -5882,7 +6356,7 @@
             <a:noAutofit/>
           </a:bodyPr>
           <a:p>
-            <a:pPr marL="285840" indent="-284760" algn="just">
+            <a:pPr marL="285840" indent="-284400" algn="just">
               <a:lnSpc>
                 <a:spcPct val="100000"/>
               </a:lnSpc>
@@ -5917,7 +6391,7 @@
             </a:endParaRPr>
           </a:p>
           <a:p>
-            <a:pPr marL="285840" indent="-284760" algn="just">
+            <a:pPr marL="285840" indent="-284400" algn="just">
               <a:lnSpc>
                 <a:spcPct val="100000"/>
               </a:lnSpc>
@@ -5952,7 +6426,7 @@
             </a:endParaRPr>
           </a:p>
           <a:p>
-            <a:pPr marL="285840" indent="-284760" algn="just">
+            <a:pPr marL="285840" indent="-284400" algn="just">
               <a:lnSpc>
                 <a:spcPct val="100000"/>
               </a:lnSpc>
@@ -5987,7 +6461,7 @@
             </a:endParaRPr>
           </a:p>
           <a:p>
-            <a:pPr marL="285840" indent="-284760" algn="just">
+            <a:pPr marL="285840" indent="-284400" algn="just">
               <a:lnSpc>
                 <a:spcPct val="100000"/>
               </a:lnSpc>
@@ -6052,7 +6526,7 @@
         <p:spPr>
           <a:xfrm>
             <a:off x="1523880" y="1581120"/>
-            <a:ext cx="7617960" cy="34560"/>
+            <a:ext cx="7617600" cy="34200"/>
           </a:xfrm>
           <a:prstGeom prst="rect">
             <a:avLst/>
@@ -6080,7 +6554,7 @@
         <p:spPr>
           <a:xfrm>
             <a:off x="1371600" y="1143000"/>
-            <a:ext cx="7770240" cy="459720"/>
+            <a:ext cx="7769880" cy="459360"/>
           </a:xfrm>
           <a:prstGeom prst="rect">
             <a:avLst/>
@@ -6101,7 +6575,7 @@
             <a:noAutofit/>
           </a:bodyPr>
           <a:p>
-            <a:pPr marL="343080" indent="-340560" algn="r">
+            <a:pPr marL="343080" indent="-340200" algn="r">
               <a:lnSpc>
                 <a:spcPct val="100000"/>
               </a:lnSpc>
@@ -6131,7 +6605,7 @@
         <p:spPr>
           <a:xfrm>
             <a:off x="590760" y="1989360"/>
-            <a:ext cx="7531560" cy="4662720"/>
+            <a:ext cx="7531200" cy="4662360"/>
           </a:xfrm>
           <a:prstGeom prst="rect">
             <a:avLst/>
@@ -6212,7 +6686,7 @@
             </a:endParaRPr>
           </a:p>
           <a:p>
-            <a:pPr marL="286560" indent="-284760">
+            <a:pPr marL="286560" indent="-284400">
               <a:lnSpc>
                 <a:spcPct val="150000"/>
               </a:lnSpc>
@@ -6237,7 +6711,7 @@
             </a:endParaRPr>
           </a:p>
           <a:p>
-            <a:pPr marL="286560" indent="-284760">
+            <a:pPr marL="286560" indent="-284400">
               <a:lnSpc>
                 <a:spcPct val="150000"/>
               </a:lnSpc>
@@ -6282,7 +6756,7 @@
             </a:endParaRPr>
           </a:p>
           <a:p>
-            <a:pPr marL="286560" indent="-284760">
+            <a:pPr marL="286560" indent="-284400">
               <a:lnSpc>
                 <a:spcPct val="150000"/>
               </a:lnSpc>
@@ -6358,7 +6832,7 @@
         <p:spPr>
           <a:xfrm>
             <a:off x="1523880" y="1581120"/>
-            <a:ext cx="7617960" cy="34560"/>
+            <a:ext cx="7617600" cy="34200"/>
           </a:xfrm>
           <a:prstGeom prst="rect">
             <a:avLst/>
@@ -6386,7 +6860,7 @@
         <p:spPr>
           <a:xfrm>
             <a:off x="1371600" y="1143000"/>
-            <a:ext cx="7770240" cy="459720"/>
+            <a:ext cx="7769880" cy="459360"/>
           </a:xfrm>
           <a:prstGeom prst="rect">
             <a:avLst/>
@@ -6407,7 +6881,7 @@
             <a:noAutofit/>
           </a:bodyPr>
           <a:p>
-            <a:pPr marL="343080" indent="-340560" algn="r">
+            <a:pPr marL="343080" indent="-340200" algn="r">
               <a:lnSpc>
                 <a:spcPct val="100000"/>
               </a:lnSpc>
@@ -6437,7 +6911,7 @@
         <p:spPr>
           <a:xfrm>
             <a:off x="590760" y="1791360"/>
-            <a:ext cx="7003440" cy="3679200"/>
+            <a:ext cx="7003080" cy="3678840"/>
           </a:xfrm>
           <a:prstGeom prst="rect">
             <a:avLst/>
@@ -6478,7 +6952,7 @@
             </a:endParaRPr>
           </a:p>
           <a:p>
-            <a:pPr marL="286560" indent="-284760">
+            <a:pPr marL="286560" indent="-284400">
               <a:lnSpc>
                 <a:spcPct val="150000"/>
               </a:lnSpc>
@@ -6503,7 +6977,7 @@
             </a:endParaRPr>
           </a:p>
           <a:p>
-            <a:pPr marL="286560" indent="-284760">
+            <a:pPr marL="286560" indent="-284400">
               <a:lnSpc>
                 <a:spcPct val="150000"/>
               </a:lnSpc>
@@ -6528,7 +7002,7 @@
             </a:endParaRPr>
           </a:p>
           <a:p>
-            <a:pPr marL="286560" indent="-284760">
+            <a:pPr marL="286560" indent="-284400">
               <a:lnSpc>
                 <a:spcPct val="150000"/>
               </a:lnSpc>
@@ -6593,7 +7067,7 @@
         <p:spPr>
           <a:xfrm>
             <a:off x="1523880" y="1581120"/>
-            <a:ext cx="7617960" cy="34200"/>
+            <a:ext cx="7617600" cy="33840"/>
           </a:xfrm>
           <a:prstGeom prst="rect">
             <a:avLst/>
@@ -6621,7 +7095,7 @@
         <p:spPr>
           <a:xfrm>
             <a:off x="1371600" y="1143000"/>
-            <a:ext cx="7770240" cy="459360"/>
+            <a:ext cx="7769880" cy="459000"/>
           </a:xfrm>
           <a:prstGeom prst="rect">
             <a:avLst/>
@@ -6642,7 +7116,7 @@
             <a:noAutofit/>
           </a:bodyPr>
           <a:p>
-            <a:pPr marL="343080" indent="-340560" algn="r">
+            <a:pPr marL="343080" indent="-340200" algn="r">
               <a:lnSpc>
                 <a:spcPct val="100000"/>
               </a:lnSpc>
@@ -6672,7 +7146,7 @@
         <p:spPr>
           <a:xfrm>
             <a:off x="505800" y="1617840"/>
-            <a:ext cx="6866280" cy="4756680"/>
+            <a:ext cx="6865920" cy="4756320"/>
           </a:xfrm>
           <a:prstGeom prst="rect">
             <a:avLst/>
@@ -6702,7 +7176,7 @@
         <p:spPr>
           <a:xfrm>
             <a:off x="288000" y="1900800"/>
-            <a:ext cx="7140600" cy="4578480"/>
+            <a:ext cx="7140240" cy="4578120"/>
           </a:xfrm>
           <a:prstGeom prst="rect">
             <a:avLst/>

</xml_diff>

<commit_message>
Add fixed algorithm to PPT
</commit_message>
<xml_diff>
--- a/presentations/Review 2 - Project Progress Presentation 2020.pptx
+++ b/presentations/Review 2 - Project Progress Presentation 2020.pptx
@@ -257,7 +257,7 @@
           </a:bodyPr>
           <a:p>
             <a:pPr algn="r"/>
-            <a:fld id="{B1113202-9E66-4603-8CFD-951FE3D79942}" type="slidenum">
+            <a:fld id="{C472C300-7137-479D-BC73-599500F62D83}" type="slidenum">
               <a:rPr b="0" lang="en-IN" sz="1400" spc="-1" strike="noStrike">
                 <a:latin typeface="Times New Roman"/>
               </a:rPr>
@@ -305,7 +305,7 @@
         <p:spPr>
           <a:xfrm>
             <a:off x="680400" y="4690800"/>
-            <a:ext cx="5435640" cy="4440600"/>
+            <a:ext cx="5435280" cy="4440240"/>
           </a:xfrm>
           <a:prstGeom prst="rect">
             <a:avLst/>
@@ -331,7 +331,7 @@
         <p:spPr>
           <a:xfrm>
             <a:off x="3849840" y="9378360"/>
-            <a:ext cx="2944080" cy="491400"/>
+            <a:ext cx="2943720" cy="491040"/>
           </a:xfrm>
           <a:prstGeom prst="rect">
             <a:avLst/>
@@ -357,7 +357,7 @@
                 <a:spcPct val="100000"/>
               </a:lnSpc>
             </a:pPr>
-            <a:fld id="{2E77DE51-1A9F-4FC8-A22C-EBF1322E77B4}" type="slidenum">
+            <a:fld id="{DCF6FA83-289D-48BC-941E-18318D76A9F5}" type="slidenum">
               <a:rPr b="0" lang="en-IN" sz="1400" spc="-1" strike="noStrike">
                 <a:solidFill>
                   <a:srgbClr val="000000"/>
@@ -408,7 +408,7 @@
         <p:spPr>
           <a:xfrm>
             <a:off x="680400" y="4690800"/>
-            <a:ext cx="5435640" cy="4440600"/>
+            <a:ext cx="5435280" cy="4440240"/>
           </a:xfrm>
           <a:prstGeom prst="rect">
             <a:avLst/>
@@ -434,7 +434,7 @@
         <p:spPr>
           <a:xfrm>
             <a:off x="3849840" y="9378360"/>
-            <a:ext cx="2944080" cy="491400"/>
+            <a:ext cx="2943720" cy="491040"/>
           </a:xfrm>
           <a:prstGeom prst="rect">
             <a:avLst/>
@@ -460,7 +460,7 @@
                 <a:spcPct val="100000"/>
               </a:lnSpc>
             </a:pPr>
-            <a:fld id="{039FCFCE-56E7-48E9-987E-53475BCBD117}" type="slidenum">
+            <a:fld id="{AA91A873-D929-46DE-AD3A-5B7C42002CB9}" type="slidenum">
               <a:rPr b="0" lang="en-IN" sz="1400" spc="-1" strike="noStrike">
                 <a:solidFill>
                   <a:srgbClr val="000000"/>
@@ -511,7 +511,7 @@
         <p:spPr>
           <a:xfrm>
             <a:off x="680400" y="4690800"/>
-            <a:ext cx="5435640" cy="4440600"/>
+            <a:ext cx="5435280" cy="4440240"/>
           </a:xfrm>
           <a:prstGeom prst="rect">
             <a:avLst/>
@@ -537,7 +537,7 @@
         <p:spPr>
           <a:xfrm>
             <a:off x="3849840" y="9378360"/>
-            <a:ext cx="2943720" cy="491760"/>
+            <a:ext cx="2943360" cy="491400"/>
           </a:xfrm>
           <a:prstGeom prst="rect">
             <a:avLst/>
@@ -563,7 +563,7 @@
                 <a:spcPct val="100000"/>
               </a:lnSpc>
             </a:pPr>
-            <a:fld id="{DC478665-0E89-4663-B971-CAC24C7B879F}" type="slidenum">
+            <a:fld id="{C417E89B-0AEC-4F75-BE80-523D5F3A8B4E}" type="slidenum">
               <a:rPr b="0" lang="en-IN" sz="1400" spc="-1" strike="noStrike">
                 <a:solidFill>
                   <a:srgbClr val="000000"/>
@@ -614,7 +614,7 @@
         <p:spPr>
           <a:xfrm>
             <a:off x="680400" y="4690800"/>
-            <a:ext cx="5435640" cy="4440600"/>
+            <a:ext cx="5435280" cy="4440240"/>
           </a:xfrm>
           <a:prstGeom prst="rect">
             <a:avLst/>
@@ -640,7 +640,7 @@
         <p:spPr>
           <a:xfrm>
             <a:off x="3849840" y="9378360"/>
-            <a:ext cx="2943720" cy="491760"/>
+            <a:ext cx="2943360" cy="491400"/>
           </a:xfrm>
           <a:prstGeom prst="rect">
             <a:avLst/>
@@ -666,7 +666,7 @@
                 <a:spcPct val="100000"/>
               </a:lnSpc>
             </a:pPr>
-            <a:fld id="{38EC0C9B-65BF-4A85-88BD-257EE13022F0}" type="slidenum">
+            <a:fld id="{AFE5C9B4-A60A-4CD1-9FA1-BFDE411D5212}" type="slidenum">
               <a:rPr b="0" lang="en-IN" sz="1400" spc="-1" strike="noStrike">
                 <a:solidFill>
                   <a:srgbClr val="000000"/>
@@ -717,7 +717,7 @@
         <p:spPr>
           <a:xfrm>
             <a:off x="680400" y="4690800"/>
-            <a:ext cx="5435640" cy="4440600"/>
+            <a:ext cx="5435280" cy="4440240"/>
           </a:xfrm>
           <a:prstGeom prst="rect">
             <a:avLst/>
@@ -743,7 +743,7 @@
         <p:spPr>
           <a:xfrm>
             <a:off x="3849840" y="9378360"/>
-            <a:ext cx="2943720" cy="491760"/>
+            <a:ext cx="2943360" cy="491400"/>
           </a:xfrm>
           <a:prstGeom prst="rect">
             <a:avLst/>
@@ -769,7 +769,7 @@
                 <a:spcPct val="100000"/>
               </a:lnSpc>
             </a:pPr>
-            <a:fld id="{491E0487-D1BF-4855-BD0B-602E7578140C}" type="slidenum">
+            <a:fld id="{5D18F1B0-0BA9-4C1F-8017-99BB2A845838}" type="slidenum">
               <a:rPr b="0" lang="en-IN" sz="1400" spc="-1" strike="noStrike">
                 <a:solidFill>
                   <a:srgbClr val="000000"/>
@@ -820,7 +820,7 @@
         <p:spPr>
           <a:xfrm>
             <a:off x="680400" y="4690800"/>
-            <a:ext cx="5435640" cy="4440600"/>
+            <a:ext cx="5435280" cy="4440240"/>
           </a:xfrm>
           <a:prstGeom prst="rect">
             <a:avLst/>
@@ -846,7 +846,7 @@
         <p:spPr>
           <a:xfrm>
             <a:off x="3849840" y="9378360"/>
-            <a:ext cx="2943720" cy="491760"/>
+            <a:ext cx="2943360" cy="491400"/>
           </a:xfrm>
           <a:prstGeom prst="rect">
             <a:avLst/>
@@ -872,7 +872,7 @@
                 <a:spcPct val="100000"/>
               </a:lnSpc>
             </a:pPr>
-            <a:fld id="{5ED10752-F8D7-4569-84F8-9D2EB78081D9}" type="slidenum">
+            <a:fld id="{48215F5C-C371-44D8-8E7A-59DF4E6F8622}" type="slidenum">
               <a:rPr b="0" lang="en-IN" sz="1400" spc="-1" strike="noStrike">
                 <a:solidFill>
                   <a:srgbClr val="000000"/>
@@ -923,7 +923,7 @@
         <p:spPr>
           <a:xfrm>
             <a:off x="680400" y="4690800"/>
-            <a:ext cx="5435640" cy="4440600"/>
+            <a:ext cx="5435280" cy="4440240"/>
           </a:xfrm>
           <a:prstGeom prst="rect">
             <a:avLst/>
@@ -949,7 +949,7 @@
         <p:spPr>
           <a:xfrm>
             <a:off x="3849840" y="9378360"/>
-            <a:ext cx="2943720" cy="491760"/>
+            <a:ext cx="2943360" cy="491400"/>
           </a:xfrm>
           <a:prstGeom prst="rect">
             <a:avLst/>
@@ -975,7 +975,7 @@
                 <a:spcPct val="100000"/>
               </a:lnSpc>
             </a:pPr>
-            <a:fld id="{7889656C-33E4-4314-B278-72632628BCFC}" type="slidenum">
+            <a:fld id="{04AE27E5-EB39-4A94-A561-1F09C2834D02}" type="slidenum">
               <a:rPr b="0" lang="en-IN" sz="1400" spc="-1" strike="noStrike">
                 <a:solidFill>
                   <a:srgbClr val="000000"/>
@@ -1026,7 +1026,7 @@
         <p:spPr>
           <a:xfrm>
             <a:off x="680400" y="4690800"/>
-            <a:ext cx="5435640" cy="4440600"/>
+            <a:ext cx="5435280" cy="4440240"/>
           </a:xfrm>
           <a:prstGeom prst="rect">
             <a:avLst/>
@@ -1052,7 +1052,7 @@
         <p:spPr>
           <a:xfrm>
             <a:off x="3849840" y="9378360"/>
-            <a:ext cx="2943720" cy="491760"/>
+            <a:ext cx="2943360" cy="491400"/>
           </a:xfrm>
           <a:prstGeom prst="rect">
             <a:avLst/>
@@ -1078,7 +1078,7 @@
                 <a:spcPct val="100000"/>
               </a:lnSpc>
             </a:pPr>
-            <a:fld id="{0D7C6A21-1A33-4A4F-80F6-749AF31F8FAF}" type="slidenum">
+            <a:fld id="{9AEA1119-259F-4E84-974B-92C044E94D09}" type="slidenum">
               <a:rPr b="0" lang="en-IN" sz="1400" spc="-1" strike="noStrike">
                 <a:solidFill>
                   <a:srgbClr val="000000"/>
@@ -1129,7 +1129,7 @@
         <p:spPr>
           <a:xfrm>
             <a:off x="680400" y="4690800"/>
-            <a:ext cx="5435640" cy="4440600"/>
+            <a:ext cx="5435280" cy="4440240"/>
           </a:xfrm>
           <a:prstGeom prst="rect">
             <a:avLst/>
@@ -1155,7 +1155,7 @@
         <p:spPr>
           <a:xfrm>
             <a:off x="3849840" y="9378360"/>
-            <a:ext cx="2943720" cy="491760"/>
+            <a:ext cx="2943360" cy="491400"/>
           </a:xfrm>
           <a:prstGeom prst="rect">
             <a:avLst/>
@@ -1181,7 +1181,7 @@
                 <a:spcPct val="100000"/>
               </a:lnSpc>
             </a:pPr>
-            <a:fld id="{DA3E7F20-717E-4602-8417-4A327972A24D}" type="slidenum">
+            <a:fld id="{E719BF8D-0F56-4823-842E-93AF991FEE83}" type="slidenum">
               <a:rPr b="0" lang="en-IN" sz="1400" spc="-1" strike="noStrike">
                 <a:solidFill>
                   <a:srgbClr val="000000"/>
@@ -1232,7 +1232,7 @@
         <p:spPr>
           <a:xfrm>
             <a:off x="680400" y="4690800"/>
-            <a:ext cx="5435640" cy="4440600"/>
+            <a:ext cx="5435280" cy="4440240"/>
           </a:xfrm>
           <a:prstGeom prst="rect">
             <a:avLst/>
@@ -1258,7 +1258,7 @@
         <p:spPr>
           <a:xfrm>
             <a:off x="3849840" y="9378360"/>
-            <a:ext cx="2944080" cy="491400"/>
+            <a:ext cx="2943720" cy="491040"/>
           </a:xfrm>
           <a:prstGeom prst="rect">
             <a:avLst/>
@@ -1284,7 +1284,7 @@
                 <a:spcPct val="100000"/>
               </a:lnSpc>
             </a:pPr>
-            <a:fld id="{B998AE1C-26A5-4A09-B666-3FE8F4354379}" type="slidenum">
+            <a:fld id="{9B41656F-6225-4F8F-AF5E-3ED1D2CA0E0C}" type="slidenum">
               <a:rPr b="0" lang="en-IN" sz="1400" spc="-1" strike="noStrike">
                 <a:solidFill>
                   <a:srgbClr val="000000"/>
@@ -2698,7 +2698,7 @@
         <p:spPr>
           <a:xfrm>
             <a:off x="0" y="-35280"/>
-            <a:ext cx="9141480" cy="6931800"/>
+            <a:ext cx="9141120" cy="6931440"/>
           </a:xfrm>
           <a:prstGeom prst="rect">
             <a:avLst/>
@@ -2717,7 +2717,7 @@
         <p:spPr>
           <a:xfrm>
             <a:off x="0" y="152280"/>
-            <a:ext cx="1445400" cy="1197720"/>
+            <a:ext cx="1445040" cy="1197360"/>
           </a:xfrm>
           <a:prstGeom prst="rect">
             <a:avLst/>
@@ -2794,7 +2794,7 @@
         <p:spPr>
           <a:xfrm>
             <a:off x="179640" y="138600"/>
-            <a:ext cx="866160" cy="969480"/>
+            <a:ext cx="865800" cy="969120"/>
           </a:xfrm>
           <a:prstGeom prst="rect">
             <a:avLst/>
@@ -2817,7 +2817,7 @@
         <p:spPr>
           <a:xfrm>
             <a:off x="2702520" y="103320"/>
-            <a:ext cx="1618560" cy="988200"/>
+            <a:ext cx="1618200" cy="987840"/>
           </a:xfrm>
           <a:prstGeom prst="rect">
             <a:avLst/>
@@ -2840,7 +2840,7 @@
         <p:spPr>
           <a:xfrm>
             <a:off x="4323600" y="106560"/>
-            <a:ext cx="1617480" cy="986040"/>
+            <a:ext cx="1617120" cy="985680"/>
           </a:xfrm>
           <a:prstGeom prst="rect">
             <a:avLst/>
@@ -2863,7 +2863,7 @@
         <p:spPr>
           <a:xfrm>
             <a:off x="5923800" y="117000"/>
-            <a:ext cx="1617480" cy="987480"/>
+            <a:ext cx="1617120" cy="987120"/>
           </a:xfrm>
           <a:prstGeom prst="rect">
             <a:avLst/>
@@ -2886,7 +2886,7 @@
         <p:spPr>
           <a:xfrm>
             <a:off x="7524000" y="111960"/>
-            <a:ext cx="1617480" cy="987480"/>
+            <a:ext cx="1617120" cy="987120"/>
           </a:xfrm>
           <a:prstGeom prst="rect">
             <a:avLst/>
@@ -2909,7 +2909,7 @@
         <p:spPr>
           <a:xfrm>
             <a:off x="1219320" y="102240"/>
-            <a:ext cx="1617480" cy="987480"/>
+            <a:ext cx="1617120" cy="987120"/>
           </a:xfrm>
           <a:prstGeom prst="rect">
             <a:avLst/>
@@ -2932,7 +2932,7 @@
         <p:spPr>
           <a:xfrm>
             <a:off x="7530120" y="1600200"/>
-            <a:ext cx="1597680" cy="5124600"/>
+            <a:ext cx="1597320" cy="5124240"/>
           </a:xfrm>
           <a:prstGeom prst="rect">
             <a:avLst/>
@@ -3204,7 +3204,7 @@
         <p:spPr>
           <a:xfrm>
             <a:off x="1413000" y="2228400"/>
-            <a:ext cx="6309360" cy="705600"/>
+            <a:ext cx="6309000" cy="705240"/>
           </a:xfrm>
           <a:prstGeom prst="rect">
             <a:avLst/>
@@ -3265,7 +3265,7 @@
         <p:spPr>
           <a:xfrm>
             <a:off x="345600" y="3850560"/>
-            <a:ext cx="8455680" cy="2003760"/>
+            <a:ext cx="8455320" cy="2003400"/>
           </a:xfrm>
           <a:prstGeom prst="rect">
             <a:avLst/>
@@ -3548,7 +3548,7 @@
         <p:spPr>
           <a:xfrm>
             <a:off x="1523880" y="1581120"/>
-            <a:ext cx="7617600" cy="33840"/>
+            <a:ext cx="7617240" cy="33480"/>
           </a:xfrm>
           <a:prstGeom prst="rect">
             <a:avLst/>
@@ -3576,7 +3576,7 @@
         <p:spPr>
           <a:xfrm>
             <a:off x="1371600" y="1143000"/>
-            <a:ext cx="7769880" cy="459000"/>
+            <a:ext cx="7769520" cy="458640"/>
           </a:xfrm>
           <a:prstGeom prst="rect">
             <a:avLst/>
@@ -3597,7 +3597,7 @@
             <a:noAutofit/>
           </a:bodyPr>
           <a:p>
-            <a:pPr marL="343080" indent="-340200" algn="r">
+            <a:pPr marL="343080" indent="-339840" algn="r">
               <a:lnSpc>
                 <a:spcPct val="100000"/>
               </a:lnSpc>
@@ -3627,7 +3627,7 @@
         <p:spPr>
           <a:xfrm>
             <a:off x="505800" y="1617840"/>
-            <a:ext cx="6865920" cy="4756320"/>
+            <a:ext cx="6865560" cy="4755960"/>
           </a:xfrm>
           <a:prstGeom prst="rect">
             <a:avLst/>
@@ -3657,7 +3657,7 @@
         <p:spPr>
           <a:xfrm>
             <a:off x="288000" y="1728000"/>
-            <a:ext cx="7271640" cy="4895640"/>
+            <a:ext cx="7271280" cy="4895280"/>
           </a:xfrm>
           <a:prstGeom prst="rect">
             <a:avLst/>
@@ -3706,7 +3706,7 @@
         <p:spPr>
           <a:xfrm>
             <a:off x="1523880" y="1581120"/>
-            <a:ext cx="7617600" cy="33840"/>
+            <a:ext cx="7617240" cy="33480"/>
           </a:xfrm>
           <a:prstGeom prst="rect">
             <a:avLst/>
@@ -3734,7 +3734,7 @@
         <p:spPr>
           <a:xfrm>
             <a:off x="1371600" y="1143000"/>
-            <a:ext cx="7769880" cy="459000"/>
+            <a:ext cx="7769520" cy="458640"/>
           </a:xfrm>
           <a:prstGeom prst="rect">
             <a:avLst/>
@@ -3755,7 +3755,7 @@
             <a:noAutofit/>
           </a:bodyPr>
           <a:p>
-            <a:pPr marL="343080" indent="-340200" algn="r">
+            <a:pPr marL="343080" indent="-339840" algn="r">
               <a:lnSpc>
                 <a:spcPct val="100000"/>
               </a:lnSpc>
@@ -3785,7 +3785,7 @@
         <p:spPr>
           <a:xfrm>
             <a:off x="505800" y="1617840"/>
-            <a:ext cx="6865920" cy="4756320"/>
+            <a:ext cx="6865560" cy="4755960"/>
           </a:xfrm>
           <a:prstGeom prst="rect">
             <a:avLst/>
@@ -3815,7 +3815,7 @@
         <p:spPr>
           <a:xfrm>
             <a:off x="144360" y="2719080"/>
-            <a:ext cx="7227360" cy="2247840"/>
+            <a:ext cx="7227000" cy="2247480"/>
           </a:xfrm>
           <a:prstGeom prst="rect">
             <a:avLst/>
@@ -3864,7 +3864,7 @@
         <p:spPr>
           <a:xfrm>
             <a:off x="1523880" y="1581120"/>
-            <a:ext cx="7617600" cy="34200"/>
+            <a:ext cx="7617240" cy="33840"/>
           </a:xfrm>
           <a:prstGeom prst="rect">
             <a:avLst/>
@@ -3892,7 +3892,7 @@
         <p:spPr>
           <a:xfrm>
             <a:off x="1371600" y="1143000"/>
-            <a:ext cx="7769880" cy="459360"/>
+            <a:ext cx="7769520" cy="459000"/>
           </a:xfrm>
           <a:prstGeom prst="rect">
             <a:avLst/>
@@ -3913,7 +3913,7 @@
             <a:noAutofit/>
           </a:bodyPr>
           <a:p>
-            <a:pPr marL="343080" indent="-340200" algn="r">
+            <a:pPr marL="343080" indent="-339840" algn="r">
               <a:lnSpc>
                 <a:spcPct val="100000"/>
               </a:lnSpc>
@@ -3943,7 +3943,7 @@
         <p:spPr>
           <a:xfrm>
             <a:off x="533520" y="2678760"/>
-            <a:ext cx="6861240" cy="3871800"/>
+            <a:ext cx="6860880" cy="3871440"/>
           </a:xfrm>
           <a:prstGeom prst="rect">
             <a:avLst/>
@@ -3964,7 +3964,7 @@
             <a:noAutofit/>
           </a:bodyPr>
           <a:p>
-            <a:pPr marL="285840" indent="-284400" algn="just">
+            <a:pPr marL="285840" indent="-284040" algn="just">
               <a:lnSpc>
                 <a:spcPct val="150000"/>
               </a:lnSpc>
@@ -3989,7 +3989,7 @@
             </a:endParaRPr>
           </a:p>
           <a:p>
-            <a:pPr marL="285840" indent="-284400" algn="just">
+            <a:pPr marL="285840" indent="-284040" algn="just">
               <a:lnSpc>
                 <a:spcPct val="150000"/>
               </a:lnSpc>
@@ -4014,7 +4014,7 @@
             </a:endParaRPr>
           </a:p>
           <a:p>
-            <a:pPr marL="285840" indent="-284400" algn="just">
+            <a:pPr marL="285840" indent="-284040" algn="just">
               <a:lnSpc>
                 <a:spcPct val="150000"/>
               </a:lnSpc>
@@ -4079,7 +4079,7 @@
         <p:spPr>
           <a:xfrm>
             <a:off x="1523880" y="1581120"/>
-            <a:ext cx="7617600" cy="34200"/>
+            <a:ext cx="7617240" cy="33840"/>
           </a:xfrm>
           <a:prstGeom prst="rect">
             <a:avLst/>
@@ -4107,7 +4107,7 @@
         <p:spPr>
           <a:xfrm>
             <a:off x="1371600" y="1143000"/>
-            <a:ext cx="7769880" cy="459360"/>
+            <a:ext cx="7769520" cy="459000"/>
           </a:xfrm>
           <a:prstGeom prst="rect">
             <a:avLst/>
@@ -4128,7 +4128,7 @@
             <a:noAutofit/>
           </a:bodyPr>
           <a:p>
-            <a:pPr marL="343080" indent="-340200" algn="r">
+            <a:pPr marL="343080" indent="-339840" algn="r">
               <a:lnSpc>
                 <a:spcPct val="100000"/>
               </a:lnSpc>
@@ -4162,7 +4162,7 @@
         <p:spPr>
           <a:xfrm>
             <a:off x="288000" y="1728000"/>
-            <a:ext cx="7271640" cy="4895640"/>
+            <a:ext cx="7271280" cy="4895280"/>
           </a:xfrm>
           <a:prstGeom prst="rect">
             <a:avLst/>
@@ -4211,7 +4211,7 @@
         <p:spPr>
           <a:xfrm>
             <a:off x="1523880" y="1581120"/>
-            <a:ext cx="7617600" cy="34200"/>
+            <a:ext cx="7617240" cy="33840"/>
           </a:xfrm>
           <a:prstGeom prst="rect">
             <a:avLst/>
@@ -4239,7 +4239,7 @@
         <p:spPr>
           <a:xfrm>
             <a:off x="1371600" y="1143000"/>
-            <a:ext cx="7769880" cy="459360"/>
+            <a:ext cx="7769520" cy="459000"/>
           </a:xfrm>
           <a:prstGeom prst="rect">
             <a:avLst/>
@@ -4260,7 +4260,7 @@
             <a:noAutofit/>
           </a:bodyPr>
           <a:p>
-            <a:pPr marL="343080" indent="-340200" algn="r">
+            <a:pPr marL="343080" indent="-339840" algn="r">
               <a:lnSpc>
                 <a:spcPct val="100000"/>
               </a:lnSpc>
@@ -4294,7 +4294,7 @@
         <p:spPr>
           <a:xfrm>
             <a:off x="238680" y="1656000"/>
-            <a:ext cx="7536240" cy="4966920"/>
+            <a:ext cx="7535880" cy="4966560"/>
           </a:xfrm>
           <a:prstGeom prst="rect">
             <a:avLst/>
@@ -4343,7 +4343,7 @@
         <p:spPr>
           <a:xfrm>
             <a:off x="1523880" y="1581120"/>
-            <a:ext cx="7617600" cy="34200"/>
+            <a:ext cx="7617240" cy="33840"/>
           </a:xfrm>
           <a:prstGeom prst="rect">
             <a:avLst/>
@@ -4371,7 +4371,7 @@
         <p:spPr>
           <a:xfrm>
             <a:off x="1371600" y="1143000"/>
-            <a:ext cx="7769880" cy="459360"/>
+            <a:ext cx="7769520" cy="459000"/>
           </a:xfrm>
           <a:prstGeom prst="rect">
             <a:avLst/>
@@ -4392,7 +4392,7 @@
             <a:noAutofit/>
           </a:bodyPr>
           <a:p>
-            <a:pPr marL="343080" indent="-340200" algn="r">
+            <a:pPr marL="343080" indent="-339840" algn="r">
               <a:lnSpc>
                 <a:spcPct val="100000"/>
               </a:lnSpc>
@@ -4421,13 +4421,13 @@
         </p:nvPicPr>
         <p:blipFill>
           <a:blip r:embed="rId1"/>
-          <a:srcRect l="0" t="5802" r="46821" b="3202"/>
+          <a:srcRect l="0" t="2800" r="50390" b="3405"/>
           <a:stretch/>
         </p:blipFill>
         <p:spPr>
           <a:xfrm>
-            <a:off x="1473840" y="1800360"/>
-            <a:ext cx="4862160" cy="4679640"/>
+            <a:off x="1944000" y="1728000"/>
+            <a:ext cx="4535640" cy="4823640"/>
           </a:xfrm>
           <a:prstGeom prst="rect">
             <a:avLst/>
@@ -4476,7 +4476,7 @@
         <p:spPr>
           <a:xfrm>
             <a:off x="1523880" y="1581120"/>
-            <a:ext cx="7617600" cy="34200"/>
+            <a:ext cx="7617240" cy="33840"/>
           </a:xfrm>
           <a:prstGeom prst="rect">
             <a:avLst/>
@@ -4504,7 +4504,7 @@
         <p:spPr>
           <a:xfrm>
             <a:off x="1371600" y="1143000"/>
-            <a:ext cx="7769880" cy="459360"/>
+            <a:ext cx="7769520" cy="459000"/>
           </a:xfrm>
           <a:prstGeom prst="rect">
             <a:avLst/>
@@ -4525,7 +4525,7 @@
             <a:noAutofit/>
           </a:bodyPr>
           <a:p>
-            <a:pPr marL="343080" indent="-340200" algn="r">
+            <a:pPr marL="343080" indent="-339840" algn="r">
               <a:lnSpc>
                 <a:spcPct val="100000"/>
               </a:lnSpc>
@@ -4559,7 +4559,7 @@
         <p:spPr>
           <a:xfrm>
             <a:off x="166680" y="1656000"/>
-            <a:ext cx="7536240" cy="4979520"/>
+            <a:ext cx="7535880" cy="4979160"/>
           </a:xfrm>
           <a:prstGeom prst="rect">
             <a:avLst/>
@@ -4608,7 +4608,7 @@
         <p:spPr>
           <a:xfrm>
             <a:off x="1523880" y="1581120"/>
-            <a:ext cx="7617600" cy="34200"/>
+            <a:ext cx="7617240" cy="33840"/>
           </a:xfrm>
           <a:prstGeom prst="rect">
             <a:avLst/>
@@ -4636,7 +4636,7 @@
         <p:spPr>
           <a:xfrm>
             <a:off x="1371600" y="1143000"/>
-            <a:ext cx="7769880" cy="459360"/>
+            <a:ext cx="7769520" cy="459000"/>
           </a:xfrm>
           <a:prstGeom prst="rect">
             <a:avLst/>
@@ -4657,7 +4657,7 @@
             <a:noAutofit/>
           </a:bodyPr>
           <a:p>
-            <a:pPr marL="343080" indent="-340200" algn="r">
+            <a:pPr marL="343080" indent="-339840" algn="r">
               <a:lnSpc>
                 <a:spcPct val="100000"/>
               </a:lnSpc>
@@ -4686,13 +4686,13 @@
         </p:nvPicPr>
         <p:blipFill>
           <a:blip r:embed="rId1"/>
-          <a:srcRect l="0" t="3227" r="52752" b="2803"/>
+          <a:srcRect l="-2360" t="4745" r="55118" b="4203"/>
           <a:stretch/>
         </p:blipFill>
         <p:spPr>
           <a:xfrm>
-            <a:off x="1440360" y="1728000"/>
-            <a:ext cx="4319640" cy="4832640"/>
+            <a:off x="2016720" y="1728000"/>
+            <a:ext cx="4463280" cy="4838760"/>
           </a:xfrm>
           <a:prstGeom prst="rect">
             <a:avLst/>
@@ -4741,7 +4741,7 @@
         <p:spPr>
           <a:xfrm>
             <a:off x="1523880" y="1581120"/>
-            <a:ext cx="7617600" cy="34200"/>
+            <a:ext cx="7617240" cy="33840"/>
           </a:xfrm>
           <a:prstGeom prst="rect">
             <a:avLst/>
@@ -4769,7 +4769,7 @@
         <p:spPr>
           <a:xfrm>
             <a:off x="1371600" y="1143000"/>
-            <a:ext cx="7769880" cy="459360"/>
+            <a:ext cx="7769520" cy="459000"/>
           </a:xfrm>
           <a:prstGeom prst="rect">
             <a:avLst/>
@@ -4790,7 +4790,7 @@
             <a:noAutofit/>
           </a:bodyPr>
           <a:p>
-            <a:pPr marL="343080" indent="-340200" algn="r">
+            <a:pPr marL="343080" indent="-339840" algn="r">
               <a:lnSpc>
                 <a:spcPct val="100000"/>
               </a:lnSpc>
@@ -4820,7 +4820,7 @@
         <p:spPr>
           <a:xfrm>
             <a:off x="480960" y="1728000"/>
-            <a:ext cx="6861240" cy="4721760"/>
+            <a:ext cx="6860880" cy="4721400"/>
           </a:xfrm>
           <a:prstGeom prst="rect">
             <a:avLst/>
@@ -4841,7 +4841,7 @@
             <a:noAutofit/>
           </a:bodyPr>
           <a:p>
-            <a:pPr marL="285840" indent="-284400" algn="just">
+            <a:pPr marL="285840" indent="-284040" algn="just">
               <a:lnSpc>
                 <a:spcPct val="100000"/>
               </a:lnSpc>
@@ -4876,7 +4876,7 @@
             </a:endParaRPr>
           </a:p>
           <a:p>
-            <a:pPr marL="285840" indent="-284400" algn="just">
+            <a:pPr marL="285840" indent="-284040" algn="just">
               <a:lnSpc>
                 <a:spcPct val="100000"/>
               </a:lnSpc>
@@ -4911,7 +4911,7 @@
             </a:endParaRPr>
           </a:p>
           <a:p>
-            <a:pPr marL="285840" indent="-284400" algn="just">
+            <a:pPr marL="285840" indent="-284040" algn="just">
               <a:lnSpc>
                 <a:spcPct val="100000"/>
               </a:lnSpc>
@@ -4976,7 +4976,7 @@
         <p:spPr>
           <a:xfrm>
             <a:off x="2847600" y="3352680"/>
-            <a:ext cx="2921400" cy="705240"/>
+            <a:ext cx="2921040" cy="704880"/>
           </a:xfrm>
           <a:prstGeom prst="rect">
             <a:avLst/>
@@ -5057,7 +5057,7 @@
         <p:spPr>
           <a:xfrm>
             <a:off x="1523880" y="1581120"/>
-            <a:ext cx="7617600" cy="33840"/>
+            <a:ext cx="7617240" cy="33480"/>
           </a:xfrm>
           <a:prstGeom prst="rect">
             <a:avLst/>
@@ -5085,7 +5085,7 @@
         <p:spPr>
           <a:xfrm>
             <a:off x="2666880" y="1143000"/>
-            <a:ext cx="6474600" cy="459000"/>
+            <a:ext cx="6474240" cy="458640"/>
           </a:xfrm>
           <a:prstGeom prst="rect">
             <a:avLst/>
@@ -5106,7 +5106,7 @@
             <a:noAutofit/>
           </a:bodyPr>
           <a:p>
-            <a:pPr marL="343080" indent="-340200" algn="r">
+            <a:pPr marL="343080" indent="-339840" algn="r">
               <a:lnSpc>
                 <a:spcPct val="100000"/>
               </a:lnSpc>
@@ -5136,7 +5136,7 @@
         <p:spPr>
           <a:xfrm>
             <a:off x="173160" y="1767960"/>
-            <a:ext cx="7454880" cy="4282920"/>
+            <a:ext cx="7454520" cy="4282560"/>
           </a:xfrm>
           <a:prstGeom prst="rect">
             <a:avLst/>
@@ -5177,7 +5177,7 @@
             </a:endParaRPr>
           </a:p>
           <a:p>
-            <a:pPr marL="527040" indent="-284400">
+            <a:pPr marL="527040" indent="-284040">
               <a:lnSpc>
                 <a:spcPct val="150000"/>
               </a:lnSpc>
@@ -5202,7 +5202,7 @@
             </a:endParaRPr>
           </a:p>
           <a:p>
-            <a:pPr marL="527040" indent="-284400">
+            <a:pPr marL="527040" indent="-284040">
               <a:lnSpc>
                 <a:spcPct val="150000"/>
               </a:lnSpc>
@@ -5227,7 +5227,7 @@
             </a:endParaRPr>
           </a:p>
           <a:p>
-            <a:pPr marL="527040" indent="-284400">
+            <a:pPr marL="527040" indent="-284040">
               <a:lnSpc>
                 <a:spcPct val="150000"/>
               </a:lnSpc>
@@ -5252,7 +5252,7 @@
             </a:endParaRPr>
           </a:p>
           <a:p>
-            <a:pPr marL="527040" indent="-284400">
+            <a:pPr marL="527040" indent="-284040">
               <a:lnSpc>
                 <a:spcPct val="150000"/>
               </a:lnSpc>
@@ -5317,7 +5317,7 @@
         <p:spPr>
           <a:xfrm>
             <a:off x="1523880" y="1581120"/>
-            <a:ext cx="7617600" cy="33840"/>
+            <a:ext cx="7617240" cy="33480"/>
           </a:xfrm>
           <a:prstGeom prst="rect">
             <a:avLst/>
@@ -5345,7 +5345,7 @@
         <p:spPr>
           <a:xfrm>
             <a:off x="2666880" y="1143000"/>
-            <a:ext cx="6474600" cy="459000"/>
+            <a:ext cx="6474240" cy="458640"/>
           </a:xfrm>
           <a:prstGeom prst="rect">
             <a:avLst/>
@@ -5366,7 +5366,7 @@
             <a:noAutofit/>
           </a:bodyPr>
           <a:p>
-            <a:pPr marL="343080" indent="-340200" algn="r">
+            <a:pPr marL="343080" indent="-339840" algn="r">
               <a:lnSpc>
                 <a:spcPct val="100000"/>
               </a:lnSpc>
@@ -5396,7 +5396,7 @@
         <p:spPr>
           <a:xfrm>
             <a:off x="0" y="1617840"/>
-            <a:ext cx="7702560" cy="4334040"/>
+            <a:ext cx="7702200" cy="4333680"/>
           </a:xfrm>
           <a:prstGeom prst="rect">
             <a:avLst/>
@@ -5437,7 +5437,7 @@
             </a:endParaRPr>
           </a:p>
           <a:p>
-            <a:pPr marL="527040" indent="-284400">
+            <a:pPr marL="527040" indent="-284040">
               <a:lnSpc>
                 <a:spcPct val="150000"/>
               </a:lnSpc>
@@ -5462,7 +5462,7 @@
             </a:endParaRPr>
           </a:p>
           <a:p>
-            <a:pPr marL="527040" indent="-284400">
+            <a:pPr marL="527040" indent="-284040">
               <a:lnSpc>
                 <a:spcPct val="150000"/>
               </a:lnSpc>
@@ -5487,7 +5487,7 @@
             </a:endParaRPr>
           </a:p>
           <a:p>
-            <a:pPr marL="527040" indent="-284400">
+            <a:pPr marL="527040" indent="-284040">
               <a:lnSpc>
                 <a:spcPct val="150000"/>
               </a:lnSpc>
@@ -5552,7 +5552,7 @@
         <p:spPr>
           <a:xfrm>
             <a:off x="1523880" y="1581120"/>
-            <a:ext cx="7617600" cy="33840"/>
+            <a:ext cx="7617240" cy="33480"/>
           </a:xfrm>
           <a:prstGeom prst="rect">
             <a:avLst/>
@@ -5580,7 +5580,7 @@
         <p:spPr>
           <a:xfrm>
             <a:off x="2666880" y="1143000"/>
-            <a:ext cx="6474600" cy="459000"/>
+            <a:ext cx="6474240" cy="458640"/>
           </a:xfrm>
           <a:prstGeom prst="rect">
             <a:avLst/>
@@ -5601,7 +5601,7 @@
             <a:noAutofit/>
           </a:bodyPr>
           <a:p>
-            <a:pPr marL="343080" indent="-340200" algn="r">
+            <a:pPr marL="343080" indent="-339840" algn="r">
               <a:lnSpc>
                 <a:spcPct val="100000"/>
               </a:lnSpc>
@@ -5631,7 +5631,7 @@
         <p:spPr>
           <a:xfrm>
             <a:off x="360000" y="1656000"/>
-            <a:ext cx="7484400" cy="4838040"/>
+            <a:ext cx="7484040" cy="4837680"/>
           </a:xfrm>
           <a:prstGeom prst="rect">
             <a:avLst/>
@@ -5672,7 +5672,7 @@
             </a:endParaRPr>
           </a:p>
           <a:p>
-            <a:pPr marL="527040" indent="-284400">
+            <a:pPr marL="527040" indent="-284040">
               <a:lnSpc>
                 <a:spcPct val="150000"/>
               </a:lnSpc>
@@ -5778,7 +5778,7 @@
             </a:endParaRPr>
           </a:p>
           <a:p>
-            <a:pPr marL="527040" indent="-284400">
+            <a:pPr marL="527040" indent="-284040">
               <a:lnSpc>
                 <a:spcPct val="150000"/>
               </a:lnSpc>
@@ -5904,7 +5904,7 @@
         <p:spPr>
           <a:xfrm>
             <a:off x="1523880" y="1581120"/>
-            <a:ext cx="7617600" cy="33840"/>
+            <a:ext cx="7617240" cy="33480"/>
           </a:xfrm>
           <a:prstGeom prst="rect">
             <a:avLst/>
@@ -5932,7 +5932,7 @@
         <p:spPr>
           <a:xfrm>
             <a:off x="2666880" y="1143000"/>
-            <a:ext cx="6474600" cy="459000"/>
+            <a:ext cx="6474240" cy="458640"/>
           </a:xfrm>
           <a:prstGeom prst="rect">
             <a:avLst/>
@@ -5953,7 +5953,7 @@
             <a:noAutofit/>
           </a:bodyPr>
           <a:p>
-            <a:pPr marL="343080" indent="-340200" algn="r">
+            <a:pPr marL="343080" indent="-339840" algn="r">
               <a:lnSpc>
                 <a:spcPct val="100000"/>
               </a:lnSpc>
@@ -5983,7 +5983,7 @@
         <p:spPr>
           <a:xfrm>
             <a:off x="360000" y="1656000"/>
-            <a:ext cx="7484400" cy="4838040"/>
+            <a:ext cx="7484040" cy="4837680"/>
           </a:xfrm>
           <a:prstGeom prst="rect">
             <a:avLst/>
@@ -6024,7 +6024,7 @@
             </a:endParaRPr>
           </a:p>
           <a:p>
-            <a:pPr marL="527040" indent="-284400">
+            <a:pPr marL="527040" indent="-284040">
               <a:lnSpc>
                 <a:spcPct val="150000"/>
               </a:lnSpc>
@@ -6130,7 +6130,7 @@
             </a:endParaRPr>
           </a:p>
           <a:p>
-            <a:pPr marL="527040" indent="-284400">
+            <a:pPr marL="527040" indent="-284040">
               <a:lnSpc>
                 <a:spcPct val="150000"/>
               </a:lnSpc>
@@ -6256,7 +6256,7 @@
         <p:spPr>
           <a:xfrm>
             <a:off x="1523880" y="1581120"/>
-            <a:ext cx="7617600" cy="34200"/>
+            <a:ext cx="7617240" cy="33840"/>
           </a:xfrm>
           <a:prstGeom prst="rect">
             <a:avLst/>
@@ -6284,7 +6284,7 @@
         <p:spPr>
           <a:xfrm>
             <a:off x="1371600" y="1143000"/>
-            <a:ext cx="7769880" cy="459360"/>
+            <a:ext cx="7769520" cy="459000"/>
           </a:xfrm>
           <a:prstGeom prst="rect">
             <a:avLst/>
@@ -6305,7 +6305,7 @@
             <a:noAutofit/>
           </a:bodyPr>
           <a:p>
-            <a:pPr marL="343080" indent="-340200" algn="r">
+            <a:pPr marL="343080" indent="-339840" algn="r">
               <a:lnSpc>
                 <a:spcPct val="100000"/>
               </a:lnSpc>
@@ -6335,7 +6335,7 @@
         <p:spPr>
           <a:xfrm>
             <a:off x="516960" y="2133720"/>
-            <a:ext cx="7003080" cy="3730680"/>
+            <a:ext cx="7002720" cy="3730320"/>
           </a:xfrm>
           <a:prstGeom prst="rect">
             <a:avLst/>
@@ -6356,7 +6356,7 @@
             <a:noAutofit/>
           </a:bodyPr>
           <a:p>
-            <a:pPr marL="285840" indent="-284400" algn="just">
+            <a:pPr marL="285840" indent="-284040" algn="just">
               <a:lnSpc>
                 <a:spcPct val="100000"/>
               </a:lnSpc>
@@ -6391,7 +6391,7 @@
             </a:endParaRPr>
           </a:p>
           <a:p>
-            <a:pPr marL="285840" indent="-284400" algn="just">
+            <a:pPr marL="285840" indent="-284040" algn="just">
               <a:lnSpc>
                 <a:spcPct val="100000"/>
               </a:lnSpc>
@@ -6426,7 +6426,7 @@
             </a:endParaRPr>
           </a:p>
           <a:p>
-            <a:pPr marL="285840" indent="-284400" algn="just">
+            <a:pPr marL="285840" indent="-284040" algn="just">
               <a:lnSpc>
                 <a:spcPct val="100000"/>
               </a:lnSpc>
@@ -6461,7 +6461,7 @@
             </a:endParaRPr>
           </a:p>
           <a:p>
-            <a:pPr marL="285840" indent="-284400" algn="just">
+            <a:pPr marL="285840" indent="-284040" algn="just">
               <a:lnSpc>
                 <a:spcPct val="100000"/>
               </a:lnSpc>
@@ -6526,7 +6526,7 @@
         <p:spPr>
           <a:xfrm>
             <a:off x="1523880" y="1581120"/>
-            <a:ext cx="7617600" cy="34200"/>
+            <a:ext cx="7617240" cy="33840"/>
           </a:xfrm>
           <a:prstGeom prst="rect">
             <a:avLst/>
@@ -6554,7 +6554,7 @@
         <p:spPr>
           <a:xfrm>
             <a:off x="1371600" y="1143000"/>
-            <a:ext cx="7769880" cy="459360"/>
+            <a:ext cx="7769520" cy="459000"/>
           </a:xfrm>
           <a:prstGeom prst="rect">
             <a:avLst/>
@@ -6575,7 +6575,7 @@
             <a:noAutofit/>
           </a:bodyPr>
           <a:p>
-            <a:pPr marL="343080" indent="-340200" algn="r">
+            <a:pPr marL="343080" indent="-339840" algn="r">
               <a:lnSpc>
                 <a:spcPct val="100000"/>
               </a:lnSpc>
@@ -6605,7 +6605,7 @@
         <p:spPr>
           <a:xfrm>
             <a:off x="590760" y="1989360"/>
-            <a:ext cx="7531200" cy="4662360"/>
+            <a:ext cx="7530840" cy="4662000"/>
           </a:xfrm>
           <a:prstGeom prst="rect">
             <a:avLst/>
@@ -6686,7 +6686,7 @@
             </a:endParaRPr>
           </a:p>
           <a:p>
-            <a:pPr marL="286560" indent="-284400">
+            <a:pPr marL="286560" indent="-284040">
               <a:lnSpc>
                 <a:spcPct val="150000"/>
               </a:lnSpc>
@@ -6711,7 +6711,7 @@
             </a:endParaRPr>
           </a:p>
           <a:p>
-            <a:pPr marL="286560" indent="-284400">
+            <a:pPr marL="286560" indent="-284040">
               <a:lnSpc>
                 <a:spcPct val="150000"/>
               </a:lnSpc>
@@ -6756,7 +6756,7 @@
             </a:endParaRPr>
           </a:p>
           <a:p>
-            <a:pPr marL="286560" indent="-284400">
+            <a:pPr marL="286560" indent="-284040">
               <a:lnSpc>
                 <a:spcPct val="150000"/>
               </a:lnSpc>
@@ -6832,7 +6832,7 @@
         <p:spPr>
           <a:xfrm>
             <a:off x="1523880" y="1581120"/>
-            <a:ext cx="7617600" cy="34200"/>
+            <a:ext cx="7617240" cy="33840"/>
           </a:xfrm>
           <a:prstGeom prst="rect">
             <a:avLst/>
@@ -6860,7 +6860,7 @@
         <p:spPr>
           <a:xfrm>
             <a:off x="1371600" y="1143000"/>
-            <a:ext cx="7769880" cy="459360"/>
+            <a:ext cx="7769520" cy="459000"/>
           </a:xfrm>
           <a:prstGeom prst="rect">
             <a:avLst/>
@@ -6881,7 +6881,7 @@
             <a:noAutofit/>
           </a:bodyPr>
           <a:p>
-            <a:pPr marL="343080" indent="-340200" algn="r">
+            <a:pPr marL="343080" indent="-339840" algn="r">
               <a:lnSpc>
                 <a:spcPct val="100000"/>
               </a:lnSpc>
@@ -6911,7 +6911,7 @@
         <p:spPr>
           <a:xfrm>
             <a:off x="590760" y="1791360"/>
-            <a:ext cx="7003080" cy="3678840"/>
+            <a:ext cx="7002720" cy="3678480"/>
           </a:xfrm>
           <a:prstGeom prst="rect">
             <a:avLst/>
@@ -6952,7 +6952,7 @@
             </a:endParaRPr>
           </a:p>
           <a:p>
-            <a:pPr marL="286560" indent="-284400">
+            <a:pPr marL="286560" indent="-284040">
               <a:lnSpc>
                 <a:spcPct val="150000"/>
               </a:lnSpc>
@@ -6977,7 +6977,7 @@
             </a:endParaRPr>
           </a:p>
           <a:p>
-            <a:pPr marL="286560" indent="-284400">
+            <a:pPr marL="286560" indent="-284040">
               <a:lnSpc>
                 <a:spcPct val="150000"/>
               </a:lnSpc>
@@ -7002,7 +7002,7 @@
             </a:endParaRPr>
           </a:p>
           <a:p>
-            <a:pPr marL="286560" indent="-284400">
+            <a:pPr marL="286560" indent="-284040">
               <a:lnSpc>
                 <a:spcPct val="150000"/>
               </a:lnSpc>
@@ -7067,7 +7067,7 @@
         <p:spPr>
           <a:xfrm>
             <a:off x="1523880" y="1581120"/>
-            <a:ext cx="7617600" cy="33840"/>
+            <a:ext cx="7617240" cy="33480"/>
           </a:xfrm>
           <a:prstGeom prst="rect">
             <a:avLst/>
@@ -7095,7 +7095,7 @@
         <p:spPr>
           <a:xfrm>
             <a:off x="1371600" y="1143000"/>
-            <a:ext cx="7769880" cy="459000"/>
+            <a:ext cx="7769520" cy="458640"/>
           </a:xfrm>
           <a:prstGeom prst="rect">
             <a:avLst/>
@@ -7116,7 +7116,7 @@
             <a:noAutofit/>
           </a:bodyPr>
           <a:p>
-            <a:pPr marL="343080" indent="-340200" algn="r">
+            <a:pPr marL="343080" indent="-339840" algn="r">
               <a:lnSpc>
                 <a:spcPct val="100000"/>
               </a:lnSpc>
@@ -7146,7 +7146,7 @@
         <p:spPr>
           <a:xfrm>
             <a:off x="505800" y="1617840"/>
-            <a:ext cx="6865920" cy="4756320"/>
+            <a:ext cx="6865560" cy="4755960"/>
           </a:xfrm>
           <a:prstGeom prst="rect">
             <a:avLst/>
@@ -7176,7 +7176,7 @@
         <p:spPr>
           <a:xfrm>
             <a:off x="288000" y="1900800"/>
-            <a:ext cx="7140240" cy="4578120"/>
+            <a:ext cx="7139880" cy="4577760"/>
           </a:xfrm>
           <a:prstGeom prst="rect">
             <a:avLst/>

</xml_diff>